<commit_message>
Updated readme and fixed secure login button
</commit_message>
<xml_diff>
--- a/The Cattle MarketPlace Solution.pptx
+++ b/The Cattle MarketPlace Solution.pptx
@@ -5,10 +5,10 @@
     <p:sldMasterId id="2147483648" r:id="rId1"/>
   </p:sldMasterIdLst>
   <p:notesMasterIdLst>
-    <p:notesMasterId r:id="rId13"/>
+    <p:notesMasterId r:id="rId14"/>
   </p:notesMasterIdLst>
   <p:handoutMasterIdLst>
-    <p:handoutMasterId r:id="rId14"/>
+    <p:handoutMasterId r:id="rId15"/>
   </p:handoutMasterIdLst>
   <p:sldIdLst>
     <p:sldId id="256" r:id="rId2"/>
@@ -18,10 +18,11 @@
     <p:sldId id="270" r:id="rId6"/>
     <p:sldId id="269" r:id="rId7"/>
     <p:sldId id="260" r:id="rId8"/>
-    <p:sldId id="259" r:id="rId9"/>
-    <p:sldId id="265" r:id="rId10"/>
-    <p:sldId id="262" r:id="rId11"/>
-    <p:sldId id="263" r:id="rId12"/>
+    <p:sldId id="271" r:id="rId9"/>
+    <p:sldId id="259" r:id="rId10"/>
+    <p:sldId id="265" r:id="rId11"/>
+    <p:sldId id="262" r:id="rId12"/>
+    <p:sldId id="263" r:id="rId13"/>
   </p:sldIdLst>
   <p:sldSz cx="12192000" cy="6858000"/>
   <p:notesSz cx="6858000" cy="9144000"/>
@@ -122,7 +123,7 @@
   </p:defaultTextStyle>
   <p:extLst>
     <p:ext uri="{EFAFB233-063F-42B5-8137-9DF3F51BA10A}">
-      <p15:sldGuideLst xmlns:p15="http://schemas.microsoft.com/office/powerpoint/2012/main">
+      <p15:sldGuideLst xmlns:p15="http://schemas.microsoft.com/office/powerpoint/2012/main" xmlns="">
         <p15:guide id="1" orient="horz" pos="2160">
           <p15:clr>
             <a:srgbClr val="A4A3A4"/>
@@ -166,7 +167,7 @@
           <p:cNvPr id="2" name="Header Placeholder 1">
             <a:extLst>
               <a:ext uri="{FF2B5EF4-FFF2-40B4-BE49-F238E27FC236}">
-                <a16:creationId xmlns:a16="http://schemas.microsoft.com/office/drawing/2014/main" id="{6C4DF60A-7FEC-4DBF-B493-CC875629EC61}"/>
+                <a16:creationId xmlns:a16="http://schemas.microsoft.com/office/drawing/2014/main" xmlns="" id="{6C4DF60A-7FEC-4DBF-B493-CC875629EC61}"/>
               </a:ext>
             </a:extLst>
           </p:cNvPr>
@@ -203,7 +204,7 @@
           <p:cNvPr id="3" name="Date Placeholder 2">
             <a:extLst>
               <a:ext uri="{FF2B5EF4-FFF2-40B4-BE49-F238E27FC236}">
-                <a16:creationId xmlns:a16="http://schemas.microsoft.com/office/drawing/2014/main" id="{C3A238AF-8D52-46C2-83FD-50DA93CB7DF0}"/>
+                <a16:creationId xmlns:a16="http://schemas.microsoft.com/office/drawing/2014/main" xmlns="" id="{C3A238AF-8D52-46C2-83FD-50DA93CB7DF0}"/>
               </a:ext>
             </a:extLst>
           </p:cNvPr>
@@ -234,7 +235,7 @@
             <a:fld id="{CDE5CB98-0069-4C9D-8ABD-AB48765DD620}" type="datetimeFigureOut">
               <a:rPr lang="x-none" smtClean="0"/>
               <a:pPr/>
-              <a:t>27-05-2019</a:t>
+              <a:t>6/22/2019</a:t>
             </a:fld>
             <a:endParaRPr lang="x-none"/>
           </a:p>
@@ -245,7 +246,7 @@
           <p:cNvPr id="4" name="Footer Placeholder 3">
             <a:extLst>
               <a:ext uri="{FF2B5EF4-FFF2-40B4-BE49-F238E27FC236}">
-                <a16:creationId xmlns:a16="http://schemas.microsoft.com/office/drawing/2014/main" id="{45385FD8-BEF9-40FF-BA74-0A214A37A0E3}"/>
+                <a16:creationId xmlns:a16="http://schemas.microsoft.com/office/drawing/2014/main" xmlns="" id="{45385FD8-BEF9-40FF-BA74-0A214A37A0E3}"/>
               </a:ext>
             </a:extLst>
           </p:cNvPr>
@@ -282,7 +283,7 @@
           <p:cNvPr id="5" name="Slide Number Placeholder 4">
             <a:extLst>
               <a:ext uri="{FF2B5EF4-FFF2-40B4-BE49-F238E27FC236}">
-                <a16:creationId xmlns:a16="http://schemas.microsoft.com/office/drawing/2014/main" id="{E9356B15-0199-4119-9EA4-5F8557889533}"/>
+                <a16:creationId xmlns:a16="http://schemas.microsoft.com/office/drawing/2014/main" xmlns="" id="{E9356B15-0199-4119-9EA4-5F8557889533}"/>
               </a:ext>
             </a:extLst>
           </p:cNvPr>
@@ -322,7 +323,7 @@
     </p:spTree>
     <p:extLst>
       <p:ext uri="{BB962C8B-B14F-4D97-AF65-F5344CB8AC3E}">
-        <p14:creationId xmlns:p14="http://schemas.microsoft.com/office/powerpoint/2010/main" val="931835128"/>
+        <p14:creationId xmlns:p14="http://schemas.microsoft.com/office/powerpoint/2010/main" xmlns="" val="931835128"/>
       </p:ext>
     </p:extLst>
   </p:cSld>
@@ -414,7 +415,7 @@
             <a:fld id="{D7E5E058-51DA-4ED6-AE85-AEF3354003AC}" type="datetimeFigureOut">
               <a:rPr lang="x-none" smtClean="0"/>
               <a:pPr/>
-              <a:t>27-05-2019</a:t>
+              <a:t>6/22/2019</a:t>
             </a:fld>
             <a:endParaRPr lang="x-none"/>
           </a:p>
@@ -583,7 +584,7 @@
     </p:spTree>
     <p:extLst>
       <p:ext uri="{BB962C8B-B14F-4D97-AF65-F5344CB8AC3E}">
-        <p14:creationId xmlns:p14="http://schemas.microsoft.com/office/powerpoint/2010/main" val="3192172232"/>
+        <p14:creationId xmlns:p14="http://schemas.microsoft.com/office/powerpoint/2010/main" xmlns="" val="3192172232"/>
       </p:ext>
     </p:extLst>
   </p:cSld>
@@ -706,7 +707,7 @@
           <p:cNvPr id="2" name="Title 1">
             <a:extLst>
               <a:ext uri="{FF2B5EF4-FFF2-40B4-BE49-F238E27FC236}">
-                <a16:creationId xmlns:a16="http://schemas.microsoft.com/office/drawing/2014/main" id="{969AE6E6-CB58-4988-9CA4-22BB9CA8BECA}"/>
+                <a16:creationId xmlns:a16="http://schemas.microsoft.com/office/drawing/2014/main" xmlns="" id="{969AE6E6-CB58-4988-9CA4-22BB9CA8BECA}"/>
               </a:ext>
             </a:extLst>
           </p:cNvPr>
@@ -744,7 +745,7 @@
           <p:cNvPr id="3" name="Subtitle 2">
             <a:extLst>
               <a:ext uri="{FF2B5EF4-FFF2-40B4-BE49-F238E27FC236}">
-                <a16:creationId xmlns:a16="http://schemas.microsoft.com/office/drawing/2014/main" id="{A8913EEE-ED33-4EC8-A46D-0A34E8982257}"/>
+                <a16:creationId xmlns:a16="http://schemas.microsoft.com/office/drawing/2014/main" xmlns="" id="{A8913EEE-ED33-4EC8-A46D-0A34E8982257}"/>
               </a:ext>
             </a:extLst>
           </p:cNvPr>
@@ -815,7 +816,7 @@
           <p:cNvPr id="4" name="Date Placeholder 3">
             <a:extLst>
               <a:ext uri="{FF2B5EF4-FFF2-40B4-BE49-F238E27FC236}">
-                <a16:creationId xmlns:a16="http://schemas.microsoft.com/office/drawing/2014/main" id="{4CF4A7BE-F4B8-4221-BF15-CF04017C0597}"/>
+                <a16:creationId xmlns:a16="http://schemas.microsoft.com/office/drawing/2014/main" xmlns="" id="{4CF4A7BE-F4B8-4221-BF15-CF04017C0597}"/>
               </a:ext>
             </a:extLst>
           </p:cNvPr>
@@ -834,7 +835,7 @@
             <a:fld id="{543B8876-8781-4047-8CE5-1D813D7FC77F}" type="datetime8">
               <a:rPr lang="x-none" smtClean="0"/>
               <a:pPr/>
-              <a:t>27-05-2019 14:43</a:t>
+              <a:t>6/22/2019 8:37 AM</a:t>
             </a:fld>
             <a:endParaRPr lang="x-none"/>
           </a:p>
@@ -845,7 +846,7 @@
           <p:cNvPr id="5" name="Footer Placeholder 4">
             <a:extLst>
               <a:ext uri="{FF2B5EF4-FFF2-40B4-BE49-F238E27FC236}">
-                <a16:creationId xmlns:a16="http://schemas.microsoft.com/office/drawing/2014/main" id="{CE36BF6F-52B9-4FC1-B995-DE43CEBC3580}"/>
+                <a16:creationId xmlns:a16="http://schemas.microsoft.com/office/drawing/2014/main" xmlns="" id="{CE36BF6F-52B9-4FC1-B995-DE43CEBC3580}"/>
               </a:ext>
             </a:extLst>
           </p:cNvPr>
@@ -870,7 +871,7 @@
           <p:cNvPr id="6" name="Slide Number Placeholder 5">
             <a:extLst>
               <a:ext uri="{FF2B5EF4-FFF2-40B4-BE49-F238E27FC236}">
-                <a16:creationId xmlns:a16="http://schemas.microsoft.com/office/drawing/2014/main" id="{FD080FC4-C3E9-4ED9-B402-A5D0DF558B7B}"/>
+                <a16:creationId xmlns:a16="http://schemas.microsoft.com/office/drawing/2014/main" xmlns="" id="{FD080FC4-C3E9-4ED9-B402-A5D0DF558B7B}"/>
               </a:ext>
             </a:extLst>
           </p:cNvPr>
@@ -898,7 +899,7 @@
     </p:spTree>
     <p:extLst>
       <p:ext uri="{BB962C8B-B14F-4D97-AF65-F5344CB8AC3E}">
-        <p14:creationId xmlns:p14="http://schemas.microsoft.com/office/powerpoint/2010/main" val="3690002511"/>
+        <p14:creationId xmlns:p14="http://schemas.microsoft.com/office/powerpoint/2010/main" xmlns="" val="3690002511"/>
       </p:ext>
     </p:extLst>
   </p:cSld>
@@ -930,7 +931,7 @@
           <p:cNvPr id="2" name="Title 1">
             <a:extLst>
               <a:ext uri="{FF2B5EF4-FFF2-40B4-BE49-F238E27FC236}">
-                <a16:creationId xmlns:a16="http://schemas.microsoft.com/office/drawing/2014/main" id="{CFD5C771-A03F-4110-858D-06F1F92DE90C}"/>
+                <a16:creationId xmlns:a16="http://schemas.microsoft.com/office/drawing/2014/main" xmlns="" id="{CFD5C771-A03F-4110-858D-06F1F92DE90C}"/>
               </a:ext>
             </a:extLst>
           </p:cNvPr>
@@ -959,7 +960,7 @@
           <p:cNvPr id="3" name="Vertical Text Placeholder 2">
             <a:extLst>
               <a:ext uri="{FF2B5EF4-FFF2-40B4-BE49-F238E27FC236}">
-                <a16:creationId xmlns:a16="http://schemas.microsoft.com/office/drawing/2014/main" id="{24E39D04-2A95-4215-98E2-5FB1945AAD00}"/>
+                <a16:creationId xmlns:a16="http://schemas.microsoft.com/office/drawing/2014/main" xmlns="" id="{24E39D04-2A95-4215-98E2-5FB1945AAD00}"/>
               </a:ext>
             </a:extLst>
           </p:cNvPr>
@@ -1017,7 +1018,7 @@
           <p:cNvPr id="4" name="Date Placeholder 3">
             <a:extLst>
               <a:ext uri="{FF2B5EF4-FFF2-40B4-BE49-F238E27FC236}">
-                <a16:creationId xmlns:a16="http://schemas.microsoft.com/office/drawing/2014/main" id="{55D25582-0812-4492-B8E3-3A17BDD1E9CA}"/>
+                <a16:creationId xmlns:a16="http://schemas.microsoft.com/office/drawing/2014/main" xmlns="" id="{55D25582-0812-4492-B8E3-3A17BDD1E9CA}"/>
               </a:ext>
             </a:extLst>
           </p:cNvPr>
@@ -1036,7 +1037,7 @@
             <a:fld id="{5DF7619D-40A3-4EBA-BFBE-A7151DBA219C}" type="datetime8">
               <a:rPr lang="x-none" smtClean="0"/>
               <a:pPr/>
-              <a:t>27-05-2019 14:43</a:t>
+              <a:t>6/22/2019 8:37 AM</a:t>
             </a:fld>
             <a:endParaRPr lang="x-none"/>
           </a:p>
@@ -1047,7 +1048,7 @@
           <p:cNvPr id="5" name="Footer Placeholder 4">
             <a:extLst>
               <a:ext uri="{FF2B5EF4-FFF2-40B4-BE49-F238E27FC236}">
-                <a16:creationId xmlns:a16="http://schemas.microsoft.com/office/drawing/2014/main" id="{20EB951C-4225-4F42-A1B8-3DCC02001FE4}"/>
+                <a16:creationId xmlns:a16="http://schemas.microsoft.com/office/drawing/2014/main" xmlns="" id="{20EB951C-4225-4F42-A1B8-3DCC02001FE4}"/>
               </a:ext>
             </a:extLst>
           </p:cNvPr>
@@ -1072,7 +1073,7 @@
           <p:cNvPr id="6" name="Slide Number Placeholder 5">
             <a:extLst>
               <a:ext uri="{FF2B5EF4-FFF2-40B4-BE49-F238E27FC236}">
-                <a16:creationId xmlns:a16="http://schemas.microsoft.com/office/drawing/2014/main" id="{9D5FA705-D18C-42C6-BFB0-8F35DC38DFC5}"/>
+                <a16:creationId xmlns:a16="http://schemas.microsoft.com/office/drawing/2014/main" xmlns="" id="{9D5FA705-D18C-42C6-BFB0-8F35DC38DFC5}"/>
               </a:ext>
             </a:extLst>
           </p:cNvPr>
@@ -1100,7 +1101,7 @@
     </p:spTree>
     <p:extLst>
       <p:ext uri="{BB962C8B-B14F-4D97-AF65-F5344CB8AC3E}">
-        <p14:creationId xmlns:p14="http://schemas.microsoft.com/office/powerpoint/2010/main" val="2111826812"/>
+        <p14:creationId xmlns:p14="http://schemas.microsoft.com/office/powerpoint/2010/main" xmlns="" val="2111826812"/>
       </p:ext>
     </p:extLst>
   </p:cSld>
@@ -1132,7 +1133,7 @@
           <p:cNvPr id="2" name="Vertical Title 1">
             <a:extLst>
               <a:ext uri="{FF2B5EF4-FFF2-40B4-BE49-F238E27FC236}">
-                <a16:creationId xmlns:a16="http://schemas.microsoft.com/office/drawing/2014/main" id="{E8DAA4CC-37ED-496F-8663-D0CF65F6CADB}"/>
+                <a16:creationId xmlns:a16="http://schemas.microsoft.com/office/drawing/2014/main" xmlns="" id="{E8DAA4CC-37ED-496F-8663-D0CF65F6CADB}"/>
               </a:ext>
             </a:extLst>
           </p:cNvPr>
@@ -1166,7 +1167,7 @@
           <p:cNvPr id="3" name="Vertical Text Placeholder 2">
             <a:extLst>
               <a:ext uri="{FF2B5EF4-FFF2-40B4-BE49-F238E27FC236}">
-                <a16:creationId xmlns:a16="http://schemas.microsoft.com/office/drawing/2014/main" id="{67130B48-703A-4183-92D8-099D681EB10D}"/>
+                <a16:creationId xmlns:a16="http://schemas.microsoft.com/office/drawing/2014/main" xmlns="" id="{67130B48-703A-4183-92D8-099D681EB10D}"/>
               </a:ext>
             </a:extLst>
           </p:cNvPr>
@@ -1229,7 +1230,7 @@
           <p:cNvPr id="4" name="Date Placeholder 3">
             <a:extLst>
               <a:ext uri="{FF2B5EF4-FFF2-40B4-BE49-F238E27FC236}">
-                <a16:creationId xmlns:a16="http://schemas.microsoft.com/office/drawing/2014/main" id="{10223FD9-84E7-4F2C-954E-B792149B0434}"/>
+                <a16:creationId xmlns:a16="http://schemas.microsoft.com/office/drawing/2014/main" xmlns="" id="{10223FD9-84E7-4F2C-954E-B792149B0434}"/>
               </a:ext>
             </a:extLst>
           </p:cNvPr>
@@ -1248,7 +1249,7 @@
             <a:fld id="{FA7BC6A9-4CF0-4EC3-A54E-BA7D4E39DD56}" type="datetime8">
               <a:rPr lang="x-none" smtClean="0"/>
               <a:pPr/>
-              <a:t>27-05-2019 14:43</a:t>
+              <a:t>6/22/2019 8:37 AM</a:t>
             </a:fld>
             <a:endParaRPr lang="x-none"/>
           </a:p>
@@ -1259,7 +1260,7 @@
           <p:cNvPr id="5" name="Footer Placeholder 4">
             <a:extLst>
               <a:ext uri="{FF2B5EF4-FFF2-40B4-BE49-F238E27FC236}">
-                <a16:creationId xmlns:a16="http://schemas.microsoft.com/office/drawing/2014/main" id="{215D33B7-22F1-4689-9764-B5B241726B70}"/>
+                <a16:creationId xmlns:a16="http://schemas.microsoft.com/office/drawing/2014/main" xmlns="" id="{215D33B7-22F1-4689-9764-B5B241726B70}"/>
               </a:ext>
             </a:extLst>
           </p:cNvPr>
@@ -1284,7 +1285,7 @@
           <p:cNvPr id="6" name="Slide Number Placeholder 5">
             <a:extLst>
               <a:ext uri="{FF2B5EF4-FFF2-40B4-BE49-F238E27FC236}">
-                <a16:creationId xmlns:a16="http://schemas.microsoft.com/office/drawing/2014/main" id="{C2201E10-F9F1-4AD4-94C3-EE13454ABA0D}"/>
+                <a16:creationId xmlns:a16="http://schemas.microsoft.com/office/drawing/2014/main" xmlns="" id="{C2201E10-F9F1-4AD4-94C3-EE13454ABA0D}"/>
               </a:ext>
             </a:extLst>
           </p:cNvPr>
@@ -1312,7 +1313,7 @@
     </p:spTree>
     <p:extLst>
       <p:ext uri="{BB962C8B-B14F-4D97-AF65-F5344CB8AC3E}">
-        <p14:creationId xmlns:p14="http://schemas.microsoft.com/office/powerpoint/2010/main" val="133888002"/>
+        <p14:creationId xmlns:p14="http://schemas.microsoft.com/office/powerpoint/2010/main" xmlns="" val="133888002"/>
       </p:ext>
     </p:extLst>
   </p:cSld>
@@ -1344,7 +1345,7 @@
           <p:cNvPr id="2" name="Title 1">
             <a:extLst>
               <a:ext uri="{FF2B5EF4-FFF2-40B4-BE49-F238E27FC236}">
-                <a16:creationId xmlns:a16="http://schemas.microsoft.com/office/drawing/2014/main" id="{AF6A55A9-607A-4010-AFCF-1A332CAB3BCD}"/>
+                <a16:creationId xmlns:a16="http://schemas.microsoft.com/office/drawing/2014/main" xmlns="" id="{AF6A55A9-607A-4010-AFCF-1A332CAB3BCD}"/>
               </a:ext>
             </a:extLst>
           </p:cNvPr>
@@ -1373,7 +1374,7 @@
           <p:cNvPr id="3" name="Content Placeholder 2">
             <a:extLst>
               <a:ext uri="{FF2B5EF4-FFF2-40B4-BE49-F238E27FC236}">
-                <a16:creationId xmlns:a16="http://schemas.microsoft.com/office/drawing/2014/main" id="{93B42EAD-FE7C-42DA-A87C-1935C426603B}"/>
+                <a16:creationId xmlns:a16="http://schemas.microsoft.com/office/drawing/2014/main" xmlns="" id="{93B42EAD-FE7C-42DA-A87C-1935C426603B}"/>
               </a:ext>
             </a:extLst>
           </p:cNvPr>
@@ -1431,7 +1432,7 @@
           <p:cNvPr id="4" name="Date Placeholder 3">
             <a:extLst>
               <a:ext uri="{FF2B5EF4-FFF2-40B4-BE49-F238E27FC236}">
-                <a16:creationId xmlns:a16="http://schemas.microsoft.com/office/drawing/2014/main" id="{936CA8D3-3B8D-40AE-B97B-57F3F409A432}"/>
+                <a16:creationId xmlns:a16="http://schemas.microsoft.com/office/drawing/2014/main" xmlns="" id="{936CA8D3-3B8D-40AE-B97B-57F3F409A432}"/>
               </a:ext>
             </a:extLst>
           </p:cNvPr>
@@ -1450,7 +1451,7 @@
             <a:fld id="{B5160B0B-0905-4F80-9B79-6ED48855F355}" type="datetime8">
               <a:rPr lang="x-none" smtClean="0"/>
               <a:pPr/>
-              <a:t>27-05-2019 14:43</a:t>
+              <a:t>6/22/2019 8:37 AM</a:t>
             </a:fld>
             <a:endParaRPr lang="x-none"/>
           </a:p>
@@ -1461,7 +1462,7 @@
           <p:cNvPr id="5" name="Footer Placeholder 4">
             <a:extLst>
               <a:ext uri="{FF2B5EF4-FFF2-40B4-BE49-F238E27FC236}">
-                <a16:creationId xmlns:a16="http://schemas.microsoft.com/office/drawing/2014/main" id="{3E304CAC-68FE-4F34-A654-80C0F51FE0BA}"/>
+                <a16:creationId xmlns:a16="http://schemas.microsoft.com/office/drawing/2014/main" xmlns="" id="{3E304CAC-68FE-4F34-A654-80C0F51FE0BA}"/>
               </a:ext>
             </a:extLst>
           </p:cNvPr>
@@ -1486,7 +1487,7 @@
           <p:cNvPr id="6" name="Slide Number Placeholder 5">
             <a:extLst>
               <a:ext uri="{FF2B5EF4-FFF2-40B4-BE49-F238E27FC236}">
-                <a16:creationId xmlns:a16="http://schemas.microsoft.com/office/drawing/2014/main" id="{9356CC07-1438-4C6C-A761-C5D02C5D8B08}"/>
+                <a16:creationId xmlns:a16="http://schemas.microsoft.com/office/drawing/2014/main" xmlns="" id="{9356CC07-1438-4C6C-A761-C5D02C5D8B08}"/>
               </a:ext>
             </a:extLst>
           </p:cNvPr>
@@ -1514,7 +1515,7 @@
     </p:spTree>
     <p:extLst>
       <p:ext uri="{BB962C8B-B14F-4D97-AF65-F5344CB8AC3E}">
-        <p14:creationId xmlns:p14="http://schemas.microsoft.com/office/powerpoint/2010/main" val="1871137777"/>
+        <p14:creationId xmlns:p14="http://schemas.microsoft.com/office/powerpoint/2010/main" xmlns="" val="1871137777"/>
       </p:ext>
     </p:extLst>
   </p:cSld>
@@ -1546,7 +1547,7 @@
           <p:cNvPr id="2" name="Title 1">
             <a:extLst>
               <a:ext uri="{FF2B5EF4-FFF2-40B4-BE49-F238E27FC236}">
-                <a16:creationId xmlns:a16="http://schemas.microsoft.com/office/drawing/2014/main" id="{41F6DD77-7629-4E85-A23D-31D0A7686925}"/>
+                <a16:creationId xmlns:a16="http://schemas.microsoft.com/office/drawing/2014/main" xmlns="" id="{41F6DD77-7629-4E85-A23D-31D0A7686925}"/>
               </a:ext>
             </a:extLst>
           </p:cNvPr>
@@ -1584,7 +1585,7 @@
           <p:cNvPr id="3" name="Text Placeholder 2">
             <a:extLst>
               <a:ext uri="{FF2B5EF4-FFF2-40B4-BE49-F238E27FC236}">
-                <a16:creationId xmlns:a16="http://schemas.microsoft.com/office/drawing/2014/main" id="{1F3CAC1B-178B-4D6C-81AA-E3010612FA60}"/>
+                <a16:creationId xmlns:a16="http://schemas.microsoft.com/office/drawing/2014/main" xmlns="" id="{1F3CAC1B-178B-4D6C-81AA-E3010612FA60}"/>
               </a:ext>
             </a:extLst>
           </p:cNvPr>
@@ -1709,7 +1710,7 @@
           <p:cNvPr id="4" name="Date Placeholder 3">
             <a:extLst>
               <a:ext uri="{FF2B5EF4-FFF2-40B4-BE49-F238E27FC236}">
-                <a16:creationId xmlns:a16="http://schemas.microsoft.com/office/drawing/2014/main" id="{2A6C9CF4-AC97-4C5D-A798-853F45F81997}"/>
+                <a16:creationId xmlns:a16="http://schemas.microsoft.com/office/drawing/2014/main" xmlns="" id="{2A6C9CF4-AC97-4C5D-A798-853F45F81997}"/>
               </a:ext>
             </a:extLst>
           </p:cNvPr>
@@ -1728,7 +1729,7 @@
             <a:fld id="{F77771E0-D1A0-495A-A685-4E4503F9074D}" type="datetime8">
               <a:rPr lang="x-none" smtClean="0"/>
               <a:pPr/>
-              <a:t>27-05-2019 14:43</a:t>
+              <a:t>6/22/2019 8:37 AM</a:t>
             </a:fld>
             <a:endParaRPr lang="x-none"/>
           </a:p>
@@ -1739,7 +1740,7 @@
           <p:cNvPr id="5" name="Footer Placeholder 4">
             <a:extLst>
               <a:ext uri="{FF2B5EF4-FFF2-40B4-BE49-F238E27FC236}">
-                <a16:creationId xmlns:a16="http://schemas.microsoft.com/office/drawing/2014/main" id="{CB67A583-797E-4AF8-8FA4-E7D70A5D1D39}"/>
+                <a16:creationId xmlns:a16="http://schemas.microsoft.com/office/drawing/2014/main" xmlns="" id="{CB67A583-797E-4AF8-8FA4-E7D70A5D1D39}"/>
               </a:ext>
             </a:extLst>
           </p:cNvPr>
@@ -1764,7 +1765,7 @@
           <p:cNvPr id="6" name="Slide Number Placeholder 5">
             <a:extLst>
               <a:ext uri="{FF2B5EF4-FFF2-40B4-BE49-F238E27FC236}">
-                <a16:creationId xmlns:a16="http://schemas.microsoft.com/office/drawing/2014/main" id="{8F03E834-10D1-449A-BCEB-5052A418E09E}"/>
+                <a16:creationId xmlns:a16="http://schemas.microsoft.com/office/drawing/2014/main" xmlns="" id="{8F03E834-10D1-449A-BCEB-5052A418E09E}"/>
               </a:ext>
             </a:extLst>
           </p:cNvPr>
@@ -1792,7 +1793,7 @@
     </p:spTree>
     <p:extLst>
       <p:ext uri="{BB962C8B-B14F-4D97-AF65-F5344CB8AC3E}">
-        <p14:creationId xmlns:p14="http://schemas.microsoft.com/office/powerpoint/2010/main" val="3487905016"/>
+        <p14:creationId xmlns:p14="http://schemas.microsoft.com/office/powerpoint/2010/main" xmlns="" val="3487905016"/>
       </p:ext>
     </p:extLst>
   </p:cSld>
@@ -1824,7 +1825,7 @@
           <p:cNvPr id="2" name="Title 1">
             <a:extLst>
               <a:ext uri="{FF2B5EF4-FFF2-40B4-BE49-F238E27FC236}">
-                <a16:creationId xmlns:a16="http://schemas.microsoft.com/office/drawing/2014/main" id="{3EF3D36A-E1BF-4410-946D-9D65475E1343}"/>
+                <a16:creationId xmlns:a16="http://schemas.microsoft.com/office/drawing/2014/main" xmlns="" id="{3EF3D36A-E1BF-4410-946D-9D65475E1343}"/>
               </a:ext>
             </a:extLst>
           </p:cNvPr>
@@ -1853,7 +1854,7 @@
           <p:cNvPr id="3" name="Content Placeholder 2">
             <a:extLst>
               <a:ext uri="{FF2B5EF4-FFF2-40B4-BE49-F238E27FC236}">
-                <a16:creationId xmlns:a16="http://schemas.microsoft.com/office/drawing/2014/main" id="{E5CD0DD9-C6D5-485F-ADD0-128F51DBA93E}"/>
+                <a16:creationId xmlns:a16="http://schemas.microsoft.com/office/drawing/2014/main" xmlns="" id="{E5CD0DD9-C6D5-485F-ADD0-128F51DBA93E}"/>
               </a:ext>
             </a:extLst>
           </p:cNvPr>
@@ -1916,7 +1917,7 @@
           <p:cNvPr id="4" name="Content Placeholder 3">
             <a:extLst>
               <a:ext uri="{FF2B5EF4-FFF2-40B4-BE49-F238E27FC236}">
-                <a16:creationId xmlns:a16="http://schemas.microsoft.com/office/drawing/2014/main" id="{89049E91-A751-436B-A398-6CDAF7C1A05B}"/>
+                <a16:creationId xmlns:a16="http://schemas.microsoft.com/office/drawing/2014/main" xmlns="" id="{89049E91-A751-436B-A398-6CDAF7C1A05B}"/>
               </a:ext>
             </a:extLst>
           </p:cNvPr>
@@ -1979,7 +1980,7 @@
           <p:cNvPr id="5" name="Date Placeholder 4">
             <a:extLst>
               <a:ext uri="{FF2B5EF4-FFF2-40B4-BE49-F238E27FC236}">
-                <a16:creationId xmlns:a16="http://schemas.microsoft.com/office/drawing/2014/main" id="{A623715A-A7A4-4BFF-B147-AE68F758EB0B}"/>
+                <a16:creationId xmlns:a16="http://schemas.microsoft.com/office/drawing/2014/main" xmlns="" id="{A623715A-A7A4-4BFF-B147-AE68F758EB0B}"/>
               </a:ext>
             </a:extLst>
           </p:cNvPr>
@@ -1998,7 +1999,7 @@
             <a:fld id="{C98FE287-2B1B-4053-9336-FD8ADED2A25E}" type="datetime8">
               <a:rPr lang="x-none" smtClean="0"/>
               <a:pPr/>
-              <a:t>27-05-2019 14:43</a:t>
+              <a:t>6/22/2019 8:37 AM</a:t>
             </a:fld>
             <a:endParaRPr lang="x-none"/>
           </a:p>
@@ -2009,7 +2010,7 @@
           <p:cNvPr id="6" name="Footer Placeholder 5">
             <a:extLst>
               <a:ext uri="{FF2B5EF4-FFF2-40B4-BE49-F238E27FC236}">
-                <a16:creationId xmlns:a16="http://schemas.microsoft.com/office/drawing/2014/main" id="{F83B1DFC-2E2E-480B-BF78-003A72CAA84B}"/>
+                <a16:creationId xmlns:a16="http://schemas.microsoft.com/office/drawing/2014/main" xmlns="" id="{F83B1DFC-2E2E-480B-BF78-003A72CAA84B}"/>
               </a:ext>
             </a:extLst>
           </p:cNvPr>
@@ -2034,7 +2035,7 @@
           <p:cNvPr id="7" name="Slide Number Placeholder 6">
             <a:extLst>
               <a:ext uri="{FF2B5EF4-FFF2-40B4-BE49-F238E27FC236}">
-                <a16:creationId xmlns:a16="http://schemas.microsoft.com/office/drawing/2014/main" id="{F8C15587-CEE6-4E45-AA90-99C15FC813B3}"/>
+                <a16:creationId xmlns:a16="http://schemas.microsoft.com/office/drawing/2014/main" xmlns="" id="{F8C15587-CEE6-4E45-AA90-99C15FC813B3}"/>
               </a:ext>
             </a:extLst>
           </p:cNvPr>
@@ -2062,7 +2063,7 @@
     </p:spTree>
     <p:extLst>
       <p:ext uri="{BB962C8B-B14F-4D97-AF65-F5344CB8AC3E}">
-        <p14:creationId xmlns:p14="http://schemas.microsoft.com/office/powerpoint/2010/main" val="2804771329"/>
+        <p14:creationId xmlns:p14="http://schemas.microsoft.com/office/powerpoint/2010/main" xmlns="" val="2804771329"/>
       </p:ext>
     </p:extLst>
   </p:cSld>
@@ -2094,7 +2095,7 @@
           <p:cNvPr id="2" name="Title 1">
             <a:extLst>
               <a:ext uri="{FF2B5EF4-FFF2-40B4-BE49-F238E27FC236}">
-                <a16:creationId xmlns:a16="http://schemas.microsoft.com/office/drawing/2014/main" id="{32FDC86F-666F-495F-B637-918FDE94D7E1}"/>
+                <a16:creationId xmlns:a16="http://schemas.microsoft.com/office/drawing/2014/main" xmlns="" id="{32FDC86F-666F-495F-B637-918FDE94D7E1}"/>
               </a:ext>
             </a:extLst>
           </p:cNvPr>
@@ -2128,7 +2129,7 @@
           <p:cNvPr id="3" name="Text Placeholder 2">
             <a:extLst>
               <a:ext uri="{FF2B5EF4-FFF2-40B4-BE49-F238E27FC236}">
-                <a16:creationId xmlns:a16="http://schemas.microsoft.com/office/drawing/2014/main" id="{F9CA7C53-C160-47F2-A6F9-ED7AA482232B}"/>
+                <a16:creationId xmlns:a16="http://schemas.microsoft.com/office/drawing/2014/main" xmlns="" id="{F9CA7C53-C160-47F2-A6F9-ED7AA482232B}"/>
               </a:ext>
             </a:extLst>
           </p:cNvPr>
@@ -2199,7 +2200,7 @@
           <p:cNvPr id="4" name="Content Placeholder 3">
             <a:extLst>
               <a:ext uri="{FF2B5EF4-FFF2-40B4-BE49-F238E27FC236}">
-                <a16:creationId xmlns:a16="http://schemas.microsoft.com/office/drawing/2014/main" id="{E6633A26-E76F-49D7-A10A-8E86AF425113}"/>
+                <a16:creationId xmlns:a16="http://schemas.microsoft.com/office/drawing/2014/main" xmlns="" id="{E6633A26-E76F-49D7-A10A-8E86AF425113}"/>
               </a:ext>
             </a:extLst>
           </p:cNvPr>
@@ -2262,7 +2263,7 @@
           <p:cNvPr id="5" name="Text Placeholder 4">
             <a:extLst>
               <a:ext uri="{FF2B5EF4-FFF2-40B4-BE49-F238E27FC236}">
-                <a16:creationId xmlns:a16="http://schemas.microsoft.com/office/drawing/2014/main" id="{CB913B92-8688-4CFC-8E45-6CB45BE7D709}"/>
+                <a16:creationId xmlns:a16="http://schemas.microsoft.com/office/drawing/2014/main" xmlns="" id="{CB913B92-8688-4CFC-8E45-6CB45BE7D709}"/>
               </a:ext>
             </a:extLst>
           </p:cNvPr>
@@ -2333,7 +2334,7 @@
           <p:cNvPr id="6" name="Content Placeholder 5">
             <a:extLst>
               <a:ext uri="{FF2B5EF4-FFF2-40B4-BE49-F238E27FC236}">
-                <a16:creationId xmlns:a16="http://schemas.microsoft.com/office/drawing/2014/main" id="{BB63826B-A942-475A-B40D-F376F09436B0}"/>
+                <a16:creationId xmlns:a16="http://schemas.microsoft.com/office/drawing/2014/main" xmlns="" id="{BB63826B-A942-475A-B40D-F376F09436B0}"/>
               </a:ext>
             </a:extLst>
           </p:cNvPr>
@@ -2396,7 +2397,7 @@
           <p:cNvPr id="7" name="Date Placeholder 6">
             <a:extLst>
               <a:ext uri="{FF2B5EF4-FFF2-40B4-BE49-F238E27FC236}">
-                <a16:creationId xmlns:a16="http://schemas.microsoft.com/office/drawing/2014/main" id="{0D1133CF-6722-4A0F-8786-A6613FB35D9A}"/>
+                <a16:creationId xmlns:a16="http://schemas.microsoft.com/office/drawing/2014/main" xmlns="" id="{0D1133CF-6722-4A0F-8786-A6613FB35D9A}"/>
               </a:ext>
             </a:extLst>
           </p:cNvPr>
@@ -2415,7 +2416,7 @@
             <a:fld id="{FAFEC031-5F87-4A57-81D2-081FD130CAF5}" type="datetime8">
               <a:rPr lang="x-none" smtClean="0"/>
               <a:pPr/>
-              <a:t>27-05-2019 14:43</a:t>
+              <a:t>6/22/2019 8:37 AM</a:t>
             </a:fld>
             <a:endParaRPr lang="x-none"/>
           </a:p>
@@ -2426,7 +2427,7 @@
           <p:cNvPr id="8" name="Footer Placeholder 7">
             <a:extLst>
               <a:ext uri="{FF2B5EF4-FFF2-40B4-BE49-F238E27FC236}">
-                <a16:creationId xmlns:a16="http://schemas.microsoft.com/office/drawing/2014/main" id="{31A35D18-9282-4816-8651-7EF389367546}"/>
+                <a16:creationId xmlns:a16="http://schemas.microsoft.com/office/drawing/2014/main" xmlns="" id="{31A35D18-9282-4816-8651-7EF389367546}"/>
               </a:ext>
             </a:extLst>
           </p:cNvPr>
@@ -2451,7 +2452,7 @@
           <p:cNvPr id="9" name="Slide Number Placeholder 8">
             <a:extLst>
               <a:ext uri="{FF2B5EF4-FFF2-40B4-BE49-F238E27FC236}">
-                <a16:creationId xmlns:a16="http://schemas.microsoft.com/office/drawing/2014/main" id="{E3A9FE59-F99F-4D9D-B91C-157C1092C3AA}"/>
+                <a16:creationId xmlns:a16="http://schemas.microsoft.com/office/drawing/2014/main" xmlns="" id="{E3A9FE59-F99F-4D9D-B91C-157C1092C3AA}"/>
               </a:ext>
             </a:extLst>
           </p:cNvPr>
@@ -2479,7 +2480,7 @@
     </p:spTree>
     <p:extLst>
       <p:ext uri="{BB962C8B-B14F-4D97-AF65-F5344CB8AC3E}">
-        <p14:creationId xmlns:p14="http://schemas.microsoft.com/office/powerpoint/2010/main" val="3646772970"/>
+        <p14:creationId xmlns:p14="http://schemas.microsoft.com/office/powerpoint/2010/main" xmlns="" val="3646772970"/>
       </p:ext>
     </p:extLst>
   </p:cSld>
@@ -2511,7 +2512,7 @@
           <p:cNvPr id="2" name="Title 1">
             <a:extLst>
               <a:ext uri="{FF2B5EF4-FFF2-40B4-BE49-F238E27FC236}">
-                <a16:creationId xmlns:a16="http://schemas.microsoft.com/office/drawing/2014/main" id="{C61F57BA-A04D-45F5-A415-3EAE21E921EB}"/>
+                <a16:creationId xmlns:a16="http://schemas.microsoft.com/office/drawing/2014/main" xmlns="" id="{C61F57BA-A04D-45F5-A415-3EAE21E921EB}"/>
               </a:ext>
             </a:extLst>
           </p:cNvPr>
@@ -2540,7 +2541,7 @@
           <p:cNvPr id="3" name="Date Placeholder 2">
             <a:extLst>
               <a:ext uri="{FF2B5EF4-FFF2-40B4-BE49-F238E27FC236}">
-                <a16:creationId xmlns:a16="http://schemas.microsoft.com/office/drawing/2014/main" id="{BD2C4EED-EAA0-47CA-8ACF-E78DC99DB8DA}"/>
+                <a16:creationId xmlns:a16="http://schemas.microsoft.com/office/drawing/2014/main" xmlns="" id="{BD2C4EED-EAA0-47CA-8ACF-E78DC99DB8DA}"/>
               </a:ext>
             </a:extLst>
           </p:cNvPr>
@@ -2559,7 +2560,7 @@
             <a:fld id="{6E507422-109C-4C1C-B1EB-63AEC703E02F}" type="datetime8">
               <a:rPr lang="x-none" smtClean="0"/>
               <a:pPr/>
-              <a:t>27-05-2019 14:43</a:t>
+              <a:t>6/22/2019 8:37 AM</a:t>
             </a:fld>
             <a:endParaRPr lang="x-none"/>
           </a:p>
@@ -2570,7 +2571,7 @@
           <p:cNvPr id="4" name="Footer Placeholder 3">
             <a:extLst>
               <a:ext uri="{FF2B5EF4-FFF2-40B4-BE49-F238E27FC236}">
-                <a16:creationId xmlns:a16="http://schemas.microsoft.com/office/drawing/2014/main" id="{08A45D35-A8A1-416C-887E-2807DD9DFB8C}"/>
+                <a16:creationId xmlns:a16="http://schemas.microsoft.com/office/drawing/2014/main" xmlns="" id="{08A45D35-A8A1-416C-887E-2807DD9DFB8C}"/>
               </a:ext>
             </a:extLst>
           </p:cNvPr>
@@ -2595,7 +2596,7 @@
           <p:cNvPr id="5" name="Slide Number Placeholder 4">
             <a:extLst>
               <a:ext uri="{FF2B5EF4-FFF2-40B4-BE49-F238E27FC236}">
-                <a16:creationId xmlns:a16="http://schemas.microsoft.com/office/drawing/2014/main" id="{621A50F5-157F-4003-B042-42064AF0AFAE}"/>
+                <a16:creationId xmlns:a16="http://schemas.microsoft.com/office/drawing/2014/main" xmlns="" id="{621A50F5-157F-4003-B042-42064AF0AFAE}"/>
               </a:ext>
             </a:extLst>
           </p:cNvPr>
@@ -2623,7 +2624,7 @@
     </p:spTree>
     <p:extLst>
       <p:ext uri="{BB962C8B-B14F-4D97-AF65-F5344CB8AC3E}">
-        <p14:creationId xmlns:p14="http://schemas.microsoft.com/office/powerpoint/2010/main" val="3098670109"/>
+        <p14:creationId xmlns:p14="http://schemas.microsoft.com/office/powerpoint/2010/main" xmlns="" val="3098670109"/>
       </p:ext>
     </p:extLst>
   </p:cSld>
@@ -2655,7 +2656,7 @@
           <p:cNvPr id="2" name="Date Placeholder 1">
             <a:extLst>
               <a:ext uri="{FF2B5EF4-FFF2-40B4-BE49-F238E27FC236}">
-                <a16:creationId xmlns:a16="http://schemas.microsoft.com/office/drawing/2014/main" id="{E25A9EB5-6732-497A-9A67-9465B2E2E939}"/>
+                <a16:creationId xmlns:a16="http://schemas.microsoft.com/office/drawing/2014/main" xmlns="" id="{E25A9EB5-6732-497A-9A67-9465B2E2E939}"/>
               </a:ext>
             </a:extLst>
           </p:cNvPr>
@@ -2674,7 +2675,7 @@
             <a:fld id="{AD6B5F6E-A40D-44F4-A146-BD04EAF16D32}" type="datetime8">
               <a:rPr lang="x-none" smtClean="0"/>
               <a:pPr/>
-              <a:t>27-05-2019 14:43</a:t>
+              <a:t>6/22/2019 8:37 AM</a:t>
             </a:fld>
             <a:endParaRPr lang="x-none"/>
           </a:p>
@@ -2685,7 +2686,7 @@
           <p:cNvPr id="3" name="Footer Placeholder 2">
             <a:extLst>
               <a:ext uri="{FF2B5EF4-FFF2-40B4-BE49-F238E27FC236}">
-                <a16:creationId xmlns:a16="http://schemas.microsoft.com/office/drawing/2014/main" id="{AB3E9A05-E4B1-486F-AA10-FAB0194354F6}"/>
+                <a16:creationId xmlns:a16="http://schemas.microsoft.com/office/drawing/2014/main" xmlns="" id="{AB3E9A05-E4B1-486F-AA10-FAB0194354F6}"/>
               </a:ext>
             </a:extLst>
           </p:cNvPr>
@@ -2710,7 +2711,7 @@
           <p:cNvPr id="4" name="Slide Number Placeholder 3">
             <a:extLst>
               <a:ext uri="{FF2B5EF4-FFF2-40B4-BE49-F238E27FC236}">
-                <a16:creationId xmlns:a16="http://schemas.microsoft.com/office/drawing/2014/main" id="{15774F33-D9C5-4E70-B4FC-BBF2762854B9}"/>
+                <a16:creationId xmlns:a16="http://schemas.microsoft.com/office/drawing/2014/main" xmlns="" id="{15774F33-D9C5-4E70-B4FC-BBF2762854B9}"/>
               </a:ext>
             </a:extLst>
           </p:cNvPr>
@@ -2738,7 +2739,7 @@
     </p:spTree>
     <p:extLst>
       <p:ext uri="{BB962C8B-B14F-4D97-AF65-F5344CB8AC3E}">
-        <p14:creationId xmlns:p14="http://schemas.microsoft.com/office/powerpoint/2010/main" val="1101430689"/>
+        <p14:creationId xmlns:p14="http://schemas.microsoft.com/office/powerpoint/2010/main" xmlns="" val="1101430689"/>
       </p:ext>
     </p:extLst>
   </p:cSld>
@@ -2770,7 +2771,7 @@
           <p:cNvPr id="2" name="Title 1">
             <a:extLst>
               <a:ext uri="{FF2B5EF4-FFF2-40B4-BE49-F238E27FC236}">
-                <a16:creationId xmlns:a16="http://schemas.microsoft.com/office/drawing/2014/main" id="{AE634D1B-C7AE-4F0A-83D3-0F2A0957D9EC}"/>
+                <a16:creationId xmlns:a16="http://schemas.microsoft.com/office/drawing/2014/main" xmlns="" id="{AE634D1B-C7AE-4F0A-83D3-0F2A0957D9EC}"/>
               </a:ext>
             </a:extLst>
           </p:cNvPr>
@@ -2808,7 +2809,7 @@
           <p:cNvPr id="3" name="Content Placeholder 2">
             <a:extLst>
               <a:ext uri="{FF2B5EF4-FFF2-40B4-BE49-F238E27FC236}">
-                <a16:creationId xmlns:a16="http://schemas.microsoft.com/office/drawing/2014/main" id="{7FD3006C-7E3A-4CBC-B90C-0168B44429D2}"/>
+                <a16:creationId xmlns:a16="http://schemas.microsoft.com/office/drawing/2014/main" xmlns="" id="{7FD3006C-7E3A-4CBC-B90C-0168B44429D2}"/>
               </a:ext>
             </a:extLst>
           </p:cNvPr>
@@ -2899,7 +2900,7 @@
           <p:cNvPr id="4" name="Text Placeholder 3">
             <a:extLst>
               <a:ext uri="{FF2B5EF4-FFF2-40B4-BE49-F238E27FC236}">
-                <a16:creationId xmlns:a16="http://schemas.microsoft.com/office/drawing/2014/main" id="{407F9946-06B9-413F-9D6E-50A5359A9517}"/>
+                <a16:creationId xmlns:a16="http://schemas.microsoft.com/office/drawing/2014/main" xmlns="" id="{407F9946-06B9-413F-9D6E-50A5359A9517}"/>
               </a:ext>
             </a:extLst>
           </p:cNvPr>
@@ -2970,7 +2971,7 @@
           <p:cNvPr id="5" name="Date Placeholder 4">
             <a:extLst>
               <a:ext uri="{FF2B5EF4-FFF2-40B4-BE49-F238E27FC236}">
-                <a16:creationId xmlns:a16="http://schemas.microsoft.com/office/drawing/2014/main" id="{BAB4E568-DF01-4247-B436-67E27A2F9B37}"/>
+                <a16:creationId xmlns:a16="http://schemas.microsoft.com/office/drawing/2014/main" xmlns="" id="{BAB4E568-DF01-4247-B436-67E27A2F9B37}"/>
               </a:ext>
             </a:extLst>
           </p:cNvPr>
@@ -2989,7 +2990,7 @@
             <a:fld id="{589E83A2-32B4-44C6-94CC-A08A017D02CF}" type="datetime8">
               <a:rPr lang="x-none" smtClean="0"/>
               <a:pPr/>
-              <a:t>27-05-2019 14:43</a:t>
+              <a:t>6/22/2019 8:37 AM</a:t>
             </a:fld>
             <a:endParaRPr lang="x-none"/>
           </a:p>
@@ -3000,7 +3001,7 @@
           <p:cNvPr id="6" name="Footer Placeholder 5">
             <a:extLst>
               <a:ext uri="{FF2B5EF4-FFF2-40B4-BE49-F238E27FC236}">
-                <a16:creationId xmlns:a16="http://schemas.microsoft.com/office/drawing/2014/main" id="{B8454900-68D8-43A7-B339-A46262355767}"/>
+                <a16:creationId xmlns:a16="http://schemas.microsoft.com/office/drawing/2014/main" xmlns="" id="{B8454900-68D8-43A7-B339-A46262355767}"/>
               </a:ext>
             </a:extLst>
           </p:cNvPr>
@@ -3025,7 +3026,7 @@
           <p:cNvPr id="7" name="Slide Number Placeholder 6">
             <a:extLst>
               <a:ext uri="{FF2B5EF4-FFF2-40B4-BE49-F238E27FC236}">
-                <a16:creationId xmlns:a16="http://schemas.microsoft.com/office/drawing/2014/main" id="{33A6C59F-FF77-4F5F-9988-67A061A20356}"/>
+                <a16:creationId xmlns:a16="http://schemas.microsoft.com/office/drawing/2014/main" xmlns="" id="{33A6C59F-FF77-4F5F-9988-67A061A20356}"/>
               </a:ext>
             </a:extLst>
           </p:cNvPr>
@@ -3053,7 +3054,7 @@
     </p:spTree>
     <p:extLst>
       <p:ext uri="{BB962C8B-B14F-4D97-AF65-F5344CB8AC3E}">
-        <p14:creationId xmlns:p14="http://schemas.microsoft.com/office/powerpoint/2010/main" val="350878728"/>
+        <p14:creationId xmlns:p14="http://schemas.microsoft.com/office/powerpoint/2010/main" xmlns="" val="350878728"/>
       </p:ext>
     </p:extLst>
   </p:cSld>
@@ -3085,7 +3086,7 @@
           <p:cNvPr id="2" name="Title 1">
             <a:extLst>
               <a:ext uri="{FF2B5EF4-FFF2-40B4-BE49-F238E27FC236}">
-                <a16:creationId xmlns:a16="http://schemas.microsoft.com/office/drawing/2014/main" id="{764AF7BD-8BB0-4003-8949-C1C319EDC419}"/>
+                <a16:creationId xmlns:a16="http://schemas.microsoft.com/office/drawing/2014/main" xmlns="" id="{764AF7BD-8BB0-4003-8949-C1C319EDC419}"/>
               </a:ext>
             </a:extLst>
           </p:cNvPr>
@@ -3123,7 +3124,7 @@
           <p:cNvPr id="3" name="Picture Placeholder 2">
             <a:extLst>
               <a:ext uri="{FF2B5EF4-FFF2-40B4-BE49-F238E27FC236}">
-                <a16:creationId xmlns:a16="http://schemas.microsoft.com/office/drawing/2014/main" id="{6FA21727-3C7D-4599-A805-1375718405D7}"/>
+                <a16:creationId xmlns:a16="http://schemas.microsoft.com/office/drawing/2014/main" xmlns="" id="{6FA21727-3C7D-4599-A805-1375718405D7}"/>
               </a:ext>
             </a:extLst>
           </p:cNvPr>
@@ -3190,7 +3191,7 @@
           <p:cNvPr id="4" name="Text Placeholder 3">
             <a:extLst>
               <a:ext uri="{FF2B5EF4-FFF2-40B4-BE49-F238E27FC236}">
-                <a16:creationId xmlns:a16="http://schemas.microsoft.com/office/drawing/2014/main" id="{9EAFD510-FABE-4D9F-B74C-ADB3428A74C2}"/>
+                <a16:creationId xmlns:a16="http://schemas.microsoft.com/office/drawing/2014/main" xmlns="" id="{9EAFD510-FABE-4D9F-B74C-ADB3428A74C2}"/>
               </a:ext>
             </a:extLst>
           </p:cNvPr>
@@ -3261,7 +3262,7 @@
           <p:cNvPr id="5" name="Date Placeholder 4">
             <a:extLst>
               <a:ext uri="{FF2B5EF4-FFF2-40B4-BE49-F238E27FC236}">
-                <a16:creationId xmlns:a16="http://schemas.microsoft.com/office/drawing/2014/main" id="{9C8969E3-7DF2-455E-8EA0-C9DB3E434EE5}"/>
+                <a16:creationId xmlns:a16="http://schemas.microsoft.com/office/drawing/2014/main" xmlns="" id="{9C8969E3-7DF2-455E-8EA0-C9DB3E434EE5}"/>
               </a:ext>
             </a:extLst>
           </p:cNvPr>
@@ -3280,7 +3281,7 @@
             <a:fld id="{D9028CC8-D893-4944-A0C0-4475208982C3}" type="datetime8">
               <a:rPr lang="x-none" smtClean="0"/>
               <a:pPr/>
-              <a:t>27-05-2019 14:43</a:t>
+              <a:t>6/22/2019 8:37 AM</a:t>
             </a:fld>
             <a:endParaRPr lang="x-none"/>
           </a:p>
@@ -3291,7 +3292,7 @@
           <p:cNvPr id="6" name="Footer Placeholder 5">
             <a:extLst>
               <a:ext uri="{FF2B5EF4-FFF2-40B4-BE49-F238E27FC236}">
-                <a16:creationId xmlns:a16="http://schemas.microsoft.com/office/drawing/2014/main" id="{B98DBF98-C762-4B47-8ED2-2AAE62D52106}"/>
+                <a16:creationId xmlns:a16="http://schemas.microsoft.com/office/drawing/2014/main" xmlns="" id="{B98DBF98-C762-4B47-8ED2-2AAE62D52106}"/>
               </a:ext>
             </a:extLst>
           </p:cNvPr>
@@ -3316,7 +3317,7 @@
           <p:cNvPr id="7" name="Slide Number Placeholder 6">
             <a:extLst>
               <a:ext uri="{FF2B5EF4-FFF2-40B4-BE49-F238E27FC236}">
-                <a16:creationId xmlns:a16="http://schemas.microsoft.com/office/drawing/2014/main" id="{03E66828-61FA-4516-A8D6-63930075185D}"/>
+                <a16:creationId xmlns:a16="http://schemas.microsoft.com/office/drawing/2014/main" xmlns="" id="{03E66828-61FA-4516-A8D6-63930075185D}"/>
               </a:ext>
             </a:extLst>
           </p:cNvPr>
@@ -3344,7 +3345,7 @@
     </p:spTree>
     <p:extLst>
       <p:ext uri="{BB962C8B-B14F-4D97-AF65-F5344CB8AC3E}">
-        <p14:creationId xmlns:p14="http://schemas.microsoft.com/office/powerpoint/2010/main" val="352894776"/>
+        <p14:creationId xmlns:p14="http://schemas.microsoft.com/office/powerpoint/2010/main" xmlns="" val="352894776"/>
       </p:ext>
     </p:extLst>
   </p:cSld>
@@ -3381,7 +3382,7 @@
           <p:cNvPr id="2" name="Title Placeholder 1">
             <a:extLst>
               <a:ext uri="{FF2B5EF4-FFF2-40B4-BE49-F238E27FC236}">
-                <a16:creationId xmlns:a16="http://schemas.microsoft.com/office/drawing/2014/main" id="{5526D27D-4C0D-4524-A18C-17CFE5D69EF2}"/>
+                <a16:creationId xmlns:a16="http://schemas.microsoft.com/office/drawing/2014/main" xmlns="" id="{5526D27D-4C0D-4524-A18C-17CFE5D69EF2}"/>
               </a:ext>
             </a:extLst>
           </p:cNvPr>
@@ -3420,7 +3421,7 @@
           <p:cNvPr id="3" name="Text Placeholder 2">
             <a:extLst>
               <a:ext uri="{FF2B5EF4-FFF2-40B4-BE49-F238E27FC236}">
-                <a16:creationId xmlns:a16="http://schemas.microsoft.com/office/drawing/2014/main" id="{92F0BFC7-4EA1-43CD-AE4C-BF377365DCAE}"/>
+                <a16:creationId xmlns:a16="http://schemas.microsoft.com/office/drawing/2014/main" xmlns="" id="{92F0BFC7-4EA1-43CD-AE4C-BF377365DCAE}"/>
               </a:ext>
             </a:extLst>
           </p:cNvPr>
@@ -3488,7 +3489,7 @@
           <p:cNvPr id="4" name="Date Placeholder 3">
             <a:extLst>
               <a:ext uri="{FF2B5EF4-FFF2-40B4-BE49-F238E27FC236}">
-                <a16:creationId xmlns:a16="http://schemas.microsoft.com/office/drawing/2014/main" id="{9C24334D-C845-4D75-B3B4-25CDAB562614}"/>
+                <a16:creationId xmlns:a16="http://schemas.microsoft.com/office/drawing/2014/main" xmlns="" id="{9C24334D-C845-4D75-B3B4-25CDAB562614}"/>
               </a:ext>
             </a:extLst>
           </p:cNvPr>
@@ -3525,7 +3526,7 @@
             <a:fld id="{F828E01B-D182-46E2-8D8F-B81C922CC6F0}" type="datetime8">
               <a:rPr lang="x-none" smtClean="0"/>
               <a:pPr/>
-              <a:t>27-05-2019 14:43</a:t>
+              <a:t>6/22/2019 8:37 AM</a:t>
             </a:fld>
             <a:endParaRPr lang="x-none"/>
           </a:p>
@@ -3536,7 +3537,7 @@
           <p:cNvPr id="5" name="Footer Placeholder 4">
             <a:extLst>
               <a:ext uri="{FF2B5EF4-FFF2-40B4-BE49-F238E27FC236}">
-                <a16:creationId xmlns:a16="http://schemas.microsoft.com/office/drawing/2014/main" id="{62C55E8E-2F2E-431B-B8AC-93F3D3673397}"/>
+                <a16:creationId xmlns:a16="http://schemas.microsoft.com/office/drawing/2014/main" xmlns="" id="{62C55E8E-2F2E-431B-B8AC-93F3D3673397}"/>
               </a:ext>
             </a:extLst>
           </p:cNvPr>
@@ -3579,7 +3580,7 @@
           <p:cNvPr id="6" name="Slide Number Placeholder 5">
             <a:extLst>
               <a:ext uri="{FF2B5EF4-FFF2-40B4-BE49-F238E27FC236}">
-                <a16:creationId xmlns:a16="http://schemas.microsoft.com/office/drawing/2014/main" id="{AF0BC0C1-396D-4D3B-8DB2-178FC26E7F93}"/>
+                <a16:creationId xmlns:a16="http://schemas.microsoft.com/office/drawing/2014/main" xmlns="" id="{AF0BC0C1-396D-4D3B-8DB2-178FC26E7F93}"/>
               </a:ext>
             </a:extLst>
           </p:cNvPr>
@@ -3625,7 +3626,7 @@
     </p:spTree>
     <p:extLst>
       <p:ext uri="{BB962C8B-B14F-4D97-AF65-F5344CB8AC3E}">
-        <p14:creationId xmlns:p14="http://schemas.microsoft.com/office/powerpoint/2010/main" val="3128163710"/>
+        <p14:creationId xmlns:p14="http://schemas.microsoft.com/office/powerpoint/2010/main" xmlns="" val="3128163710"/>
       </p:ext>
     </p:extLst>
   </p:cSld>
@@ -3949,7 +3950,7 @@
           <p:cNvPr id="2" name="Title 1">
             <a:extLst>
               <a:ext uri="{FF2B5EF4-FFF2-40B4-BE49-F238E27FC236}">
-                <a16:creationId xmlns:a16="http://schemas.microsoft.com/office/drawing/2014/main" id="{B426840B-9D3C-47BE-826E-9F7D2C3535D8}"/>
+                <a16:creationId xmlns:a16="http://schemas.microsoft.com/office/drawing/2014/main" xmlns="" id="{B426840B-9D3C-47BE-826E-9F7D2C3535D8}"/>
               </a:ext>
             </a:extLst>
           </p:cNvPr>
@@ -4003,7 +4004,7 @@
           <p:cNvPr id="3" name="Subtitle 2">
             <a:extLst>
               <a:ext uri="{FF2B5EF4-FFF2-40B4-BE49-F238E27FC236}">
-                <a16:creationId xmlns:a16="http://schemas.microsoft.com/office/drawing/2014/main" id="{300E4B0D-9B9A-416F-A841-277DA50ECDC5}"/>
+                <a16:creationId xmlns:a16="http://schemas.microsoft.com/office/drawing/2014/main" xmlns="" id="{300E4B0D-9B9A-416F-A841-277DA50ECDC5}"/>
               </a:ext>
             </a:extLst>
           </p:cNvPr>
@@ -4075,7 +4076,7 @@
             <p:cNvPr id="8" name="Picture 7" descr="A picture containing object&#10;&#10;Description automatically generated">
               <a:extLst>
                 <a:ext uri="{FF2B5EF4-FFF2-40B4-BE49-F238E27FC236}">
-                  <a16:creationId xmlns:a16="http://schemas.microsoft.com/office/drawing/2014/main" id="{E4589177-0206-43CD-A920-C47FFB866F9A}"/>
+                  <a16:creationId xmlns:a16="http://schemas.microsoft.com/office/drawing/2014/main" xmlns="" id="{E4589177-0206-43CD-A920-C47FFB866F9A}"/>
                 </a:ext>
               </a:extLst>
             </p:cNvPr>
@@ -4088,7 +4089,7 @@
             <a:blip r:embed="rId2" cstate="print">
               <a:extLst>
                 <a:ext uri="{28A0092B-C50C-407E-A947-70E740481C1C}">
-                  <a14:useLocalDpi xmlns:a14="http://schemas.microsoft.com/office/drawing/2010/main" val="0"/>
+                  <a14:useLocalDpi xmlns:a14="http://schemas.microsoft.com/office/drawing/2010/main" xmlns="" val="0"/>
                 </a:ext>
               </a:extLst>
             </a:blip>
@@ -4187,7 +4188,7 @@
     </p:spTree>
     <p:extLst>
       <p:ext uri="{BB962C8B-B14F-4D97-AF65-F5344CB8AC3E}">
-        <p14:creationId xmlns:p14="http://schemas.microsoft.com/office/powerpoint/2010/main" val="1246779874"/>
+        <p14:creationId xmlns:p14="http://schemas.microsoft.com/office/powerpoint/2010/main" xmlns="" val="1246779874"/>
       </p:ext>
     </p:extLst>
   </p:cSld>
@@ -4226,7 +4227,7 @@
           <p:cNvPr id="2" name="Title 1">
             <a:extLst>
               <a:ext uri="{FF2B5EF4-FFF2-40B4-BE49-F238E27FC236}">
-                <a16:creationId xmlns:a16="http://schemas.microsoft.com/office/drawing/2014/main" id="{1779BDB0-0623-40E9-B781-44E6D411EFB4}"/>
+                <a16:creationId xmlns:a16="http://schemas.microsoft.com/office/drawing/2014/main" xmlns="" id="{BD13EB1C-7B6B-4D07-AF79-AF0F1FB29BDA}"/>
               </a:ext>
             </a:extLst>
           </p:cNvPr>
@@ -4237,45 +4238,23 @@
             <p:ph type="title"/>
           </p:nvPr>
         </p:nvSpPr>
-        <p:spPr/>
-        <p:txBody>
-          <a:bodyPr/>
+        <p:spPr>
+          <a:xfrm>
+            <a:off x="838200" y="2511977"/>
+            <a:ext cx="10515600" cy="1325563"/>
+          </a:xfrm>
+        </p:spPr>
+        <p:txBody>
+          <a:bodyPr>
+            <a:normAutofit/>
+          </a:bodyPr>
           <a:lstStyle/>
           <a:p>
             <a:r>
-              <a:rPr lang="en-US" dirty="0"/>
-              <a:t>Challenges</a:t>
-            </a:r>
-            <a:endParaRPr lang="x-none" dirty="0"/>
-          </a:p>
-        </p:txBody>
-      </p:sp>
-      <p:sp>
-        <p:nvSpPr>
-          <p:cNvPr id="3" name="Content Placeholder 2">
-            <a:extLst>
-              <a:ext uri="{FF2B5EF4-FFF2-40B4-BE49-F238E27FC236}">
-                <a16:creationId xmlns:a16="http://schemas.microsoft.com/office/drawing/2014/main" id="{ABAB2B9B-CA20-4EAC-A3AB-8F8EE5B74611}"/>
-              </a:ext>
-            </a:extLst>
-          </p:cNvPr>
-          <p:cNvSpPr>
-            <a:spLocks noGrp="1"/>
-          </p:cNvSpPr>
-          <p:nvPr>
-            <p:ph idx="1"/>
-          </p:nvPr>
-        </p:nvSpPr>
-        <p:spPr/>
-        <p:txBody>
-          <a:bodyPr/>
-          <a:lstStyle/>
-          <a:p>
-            <a:r>
-              <a:rPr lang="en-IN" dirty="0"/>
-              <a:t>To choose the seller automatically based on the published requirements by the buyer</a:t>
-            </a:r>
-            <a:endParaRPr lang="x-none" dirty="0"/>
+              <a:rPr lang="en-US" sz="6600" dirty="0"/>
+              <a:t>Thank you</a:t>
+            </a:r>
+            <a:endParaRPr lang="x-none" sz="6600" dirty="0"/>
           </a:p>
         </p:txBody>
       </p:sp>
@@ -4284,7 +4263,7 @@
           <p:cNvPr id="4" name="Slide Number Placeholder 3">
             <a:extLst>
               <a:ext uri="{FF2B5EF4-FFF2-40B4-BE49-F238E27FC236}">
-                <a16:creationId xmlns:a16="http://schemas.microsoft.com/office/drawing/2014/main" id="{130709BF-4E90-4F76-97D9-AC71C1A4E636}"/>
+                <a16:creationId xmlns:a16="http://schemas.microsoft.com/office/drawing/2014/main" xmlns="" id="{ED112E45-08B5-4810-AA0F-3DDD82E887C1}"/>
               </a:ext>
             </a:extLst>
           </p:cNvPr>
@@ -4304,6 +4283,280 @@
               <a:rPr lang="x-none" smtClean="0"/>
               <a:pPr/>
               <a:t>10</a:t>
+            </a:fld>
+            <a:endParaRPr lang="x-none"/>
+          </a:p>
+        </p:txBody>
+      </p:sp>
+      <p:grpSp>
+        <p:nvGrpSpPr>
+          <p:cNvPr id="5" name="Group 4"/>
+          <p:cNvGrpSpPr/>
+          <p:nvPr/>
+        </p:nvGrpSpPr>
+        <p:grpSpPr>
+          <a:xfrm>
+            <a:off x="9845869" y="206991"/>
+            <a:ext cx="2144486" cy="977521"/>
+            <a:chOff x="359228" y="296105"/>
+            <a:chExt cx="2144486" cy="977521"/>
+          </a:xfrm>
+        </p:grpSpPr>
+        <p:pic>
+          <p:nvPicPr>
+            <p:cNvPr id="6" name="Picture 5" descr="A picture containing object&#10;&#10;Description automatically generated">
+              <a:extLst>
+                <a:ext uri="{FF2B5EF4-FFF2-40B4-BE49-F238E27FC236}">
+                  <a16:creationId xmlns:a16="http://schemas.microsoft.com/office/drawing/2014/main" xmlns="" id="{E4589177-0206-43CD-A920-C47FFB866F9A}"/>
+                </a:ext>
+              </a:extLst>
+            </p:cNvPr>
+            <p:cNvPicPr>
+              <a:picLocks noChangeAspect="1"/>
+            </p:cNvPicPr>
+            <p:nvPr/>
+          </p:nvPicPr>
+          <p:blipFill>
+            <a:blip r:embed="rId2" cstate="print">
+              <a:extLst>
+                <a:ext uri="{28A0092B-C50C-407E-A947-70E740481C1C}">
+                  <a14:useLocalDpi xmlns:a14="http://schemas.microsoft.com/office/drawing/2010/main" xmlns="" val="0"/>
+                </a:ext>
+              </a:extLst>
+            </a:blip>
+            <a:stretch>
+              <a:fillRect/>
+            </a:stretch>
+          </p:blipFill>
+          <p:spPr>
+            <a:xfrm>
+              <a:off x="729341" y="296105"/>
+              <a:ext cx="1400175" cy="504825"/>
+            </a:xfrm>
+            <a:prstGeom prst="rect">
+              <a:avLst/>
+            </a:prstGeom>
+            <a:noFill/>
+          </p:spPr>
+        </p:pic>
+        <p:sp>
+          <p:nvSpPr>
+            <p:cNvPr id="7" name="Rectangle 6"/>
+            <p:cNvSpPr/>
+            <p:nvPr/>
+          </p:nvSpPr>
+          <p:spPr>
+            <a:xfrm>
+              <a:off x="359228" y="751112"/>
+              <a:ext cx="2144486" cy="522514"/>
+            </a:xfrm>
+            <a:prstGeom prst="rect">
+              <a:avLst/>
+            </a:prstGeom>
+            <a:noFill/>
+            <a:ln>
+              <a:noFill/>
+            </a:ln>
+          </p:spPr>
+          <p:style>
+            <a:lnRef idx="2">
+              <a:schemeClr val="accent1">
+                <a:shade val="50000"/>
+              </a:schemeClr>
+            </a:lnRef>
+            <a:fillRef idx="1">
+              <a:schemeClr val="accent1"/>
+            </a:fillRef>
+            <a:effectRef idx="0">
+              <a:schemeClr val="accent1"/>
+            </a:effectRef>
+            <a:fontRef idx="minor">
+              <a:schemeClr val="lt1"/>
+            </a:fontRef>
+          </p:style>
+          <p:txBody>
+            <a:bodyPr rtlCol="0" anchor="ctr"/>
+            <a:lstStyle/>
+            <a:p>
+              <a:pPr algn="ctr"/>
+              <a:r>
+                <a:rPr lang="en-US" sz="800" dirty="0" smtClean="0">
+                  <a:solidFill>
+                    <a:schemeClr val="accent1">
+                      <a:lumMod val="50000"/>
+                    </a:schemeClr>
+                  </a:solidFill>
+                  <a:latin typeface="Robo-Clone Straight Expanded" pitchFamily="2" charset="0"/>
+                </a:rPr>
+                <a:t>By Team</a:t>
+              </a:r>
+            </a:p>
+            <a:p>
+              <a:pPr algn="ctr"/>
+              <a:r>
+                <a:rPr lang="en-US" sz="1200" dirty="0" smtClean="0">
+                  <a:solidFill>
+                    <a:schemeClr val="accent1">
+                      <a:lumMod val="50000"/>
+                    </a:schemeClr>
+                  </a:solidFill>
+                  <a:latin typeface="Robo-Clone Straight Expanded" pitchFamily="2" charset="0"/>
+                </a:rPr>
+                <a:t>SUPER PROGRAMMERS</a:t>
+              </a:r>
+              <a:endParaRPr lang="en-US" sz="1200" dirty="0">
+                <a:solidFill>
+                  <a:schemeClr val="accent1">
+                    <a:lumMod val="50000"/>
+                  </a:schemeClr>
+                </a:solidFill>
+                <a:latin typeface="Robo-Clone Straight Expanded" pitchFamily="2" charset="0"/>
+              </a:endParaRPr>
+            </a:p>
+          </p:txBody>
+        </p:sp>
+      </p:grpSp>
+    </p:spTree>
+    <p:extLst>
+      <p:ext uri="{BB962C8B-B14F-4D97-AF65-F5344CB8AC3E}">
+        <p14:creationId xmlns:p14="http://schemas.microsoft.com/office/powerpoint/2010/main" xmlns="" val="2756391746"/>
+      </p:ext>
+    </p:extLst>
+  </p:cSld>
+  <p:clrMapOvr>
+    <a:masterClrMapping/>
+  </p:clrMapOvr>
+  <p:timing>
+    <p:tnLst>
+      <p:par>
+        <p:cTn id="1" dur="indefinite" restart="never" nodeType="tmRoot"/>
+      </p:par>
+    </p:tnLst>
+  </p:timing>
+</p:sld>
+</file>
+
+<file path=ppt/slides/slide11.xml><?xml version="1.0" encoding="utf-8"?>
+<p:sld xmlns:a="http://schemas.openxmlformats.org/drawingml/2006/main" xmlns:r="http://schemas.openxmlformats.org/officeDocument/2006/relationships" xmlns:p="http://schemas.openxmlformats.org/presentationml/2006/main">
+  <p:cSld>
+    <p:spTree>
+      <p:nvGrpSpPr>
+        <p:cNvPr id="1" name=""/>
+        <p:cNvGrpSpPr/>
+        <p:nvPr/>
+      </p:nvGrpSpPr>
+      <p:grpSpPr>
+        <a:xfrm>
+          <a:off x="0" y="0"/>
+          <a:ext cx="0" cy="0"/>
+          <a:chOff x="0" y="0"/>
+          <a:chExt cx="0" cy="0"/>
+        </a:xfrm>
+      </p:grpSpPr>
+      <p:sp>
+        <p:nvSpPr>
+          <p:cNvPr id="2" name="Title 1">
+            <a:extLst>
+              <a:ext uri="{FF2B5EF4-FFF2-40B4-BE49-F238E27FC236}">
+                <a16:creationId xmlns:a16="http://schemas.microsoft.com/office/drawing/2014/main" xmlns="" id="{1779BDB0-0623-40E9-B781-44E6D411EFB4}"/>
+              </a:ext>
+            </a:extLst>
+          </p:cNvPr>
+          <p:cNvSpPr>
+            <a:spLocks noGrp="1"/>
+          </p:cNvSpPr>
+          <p:nvPr>
+            <p:ph type="title"/>
+          </p:nvPr>
+        </p:nvSpPr>
+        <p:spPr/>
+        <p:txBody>
+          <a:bodyPr/>
+          <a:lstStyle/>
+          <a:p>
+            <a:r>
+              <a:rPr lang="en-US" dirty="0" smtClean="0"/>
+              <a:t>Extended Work – Bonus Points</a:t>
+            </a:r>
+            <a:endParaRPr lang="x-none" dirty="0"/>
+          </a:p>
+        </p:txBody>
+      </p:sp>
+      <p:sp>
+        <p:nvSpPr>
+          <p:cNvPr id="3" name="Content Placeholder 2">
+            <a:extLst>
+              <a:ext uri="{FF2B5EF4-FFF2-40B4-BE49-F238E27FC236}">
+                <a16:creationId xmlns:a16="http://schemas.microsoft.com/office/drawing/2014/main" xmlns="" id="{ABAB2B9B-CA20-4EAC-A3AB-8F8EE5B74611}"/>
+              </a:ext>
+            </a:extLst>
+          </p:cNvPr>
+          <p:cNvSpPr>
+            <a:spLocks noGrp="1"/>
+          </p:cNvSpPr>
+          <p:nvPr>
+            <p:ph idx="1"/>
+          </p:nvPr>
+        </p:nvSpPr>
+        <p:spPr/>
+        <p:txBody>
+          <a:bodyPr/>
+          <a:lstStyle/>
+          <a:p>
+            <a:r>
+              <a:rPr lang="en-US" dirty="0" smtClean="0"/>
+              <a:t>Application is Scalable – It can reused for </a:t>
+            </a:r>
+            <a:r>
+              <a:rPr lang="en-US" dirty="0" smtClean="0"/>
+              <a:t>other </a:t>
+            </a:r>
+            <a:r>
+              <a:rPr lang="en-US" dirty="0" smtClean="0"/>
+              <a:t>marketplaces</a:t>
+            </a:r>
+          </a:p>
+          <a:p>
+            <a:endParaRPr lang="en-US" dirty="0" smtClean="0"/>
+          </a:p>
+          <a:p>
+            <a:r>
+              <a:rPr lang="en-US" dirty="0" smtClean="0"/>
+              <a:t>Application is Mobile </a:t>
+            </a:r>
+            <a:r>
+              <a:rPr lang="en-US" dirty="0" err="1" smtClean="0"/>
+              <a:t>Compatibe</a:t>
+            </a:r>
+            <a:endParaRPr lang="x-none" dirty="0"/>
+          </a:p>
+        </p:txBody>
+      </p:sp>
+      <p:sp>
+        <p:nvSpPr>
+          <p:cNvPr id="4" name="Slide Number Placeholder 3">
+            <a:extLst>
+              <a:ext uri="{FF2B5EF4-FFF2-40B4-BE49-F238E27FC236}">
+                <a16:creationId xmlns:a16="http://schemas.microsoft.com/office/drawing/2014/main" xmlns="" id="{130709BF-4E90-4F76-97D9-AC71C1A4E636}"/>
+              </a:ext>
+            </a:extLst>
+          </p:cNvPr>
+          <p:cNvSpPr>
+            <a:spLocks noGrp="1"/>
+          </p:cNvSpPr>
+          <p:nvPr>
+            <p:ph type="sldNum" sz="quarter" idx="12"/>
+          </p:nvPr>
+        </p:nvSpPr>
+        <p:spPr/>
+        <p:txBody>
+          <a:bodyPr/>
+          <a:lstStyle/>
+          <a:p>
+            <a:fld id="{1BEDFFD4-B6F5-47F1-AF42-063036A3A505}" type="slidenum">
+              <a:rPr lang="x-none" smtClean="0"/>
+              <a:pPr/>
+              <a:t>11</a:t>
             </a:fld>
             <a:endParaRPr lang="x-none"/>
           </a:p>
@@ -4328,7 +4581,7 @@
             <p:cNvPr id="7" name="Picture 6" descr="A picture containing object&#10;&#10;Description automatically generated">
               <a:extLst>
                 <a:ext uri="{FF2B5EF4-FFF2-40B4-BE49-F238E27FC236}">
-                  <a16:creationId xmlns:a16="http://schemas.microsoft.com/office/drawing/2014/main" id="{E4589177-0206-43CD-A920-C47FFB866F9A}"/>
+                  <a16:creationId xmlns:a16="http://schemas.microsoft.com/office/drawing/2014/main" xmlns="" id="{E4589177-0206-43CD-A920-C47FFB866F9A}"/>
                 </a:ext>
               </a:extLst>
             </p:cNvPr>
@@ -4341,7 +4594,7 @@
             <a:blip r:embed="rId2" cstate="print">
               <a:extLst>
                 <a:ext uri="{28A0092B-C50C-407E-A947-70E740481C1C}">
-                  <a14:useLocalDpi xmlns:a14="http://schemas.microsoft.com/office/drawing/2010/main" val="0"/>
+                  <a14:useLocalDpi xmlns:a14="http://schemas.microsoft.com/office/drawing/2010/main" xmlns="" val="0"/>
                 </a:ext>
               </a:extLst>
             </a:blip>
@@ -4440,7 +4693,7 @@
     </p:spTree>
     <p:extLst>
       <p:ext uri="{BB962C8B-B14F-4D97-AF65-F5344CB8AC3E}">
-        <p14:creationId xmlns:p14="http://schemas.microsoft.com/office/powerpoint/2010/main" val="349553836"/>
+        <p14:creationId xmlns:p14="http://schemas.microsoft.com/office/powerpoint/2010/main" xmlns="" val="349553836"/>
       </p:ext>
     </p:extLst>
   </p:cSld>
@@ -4457,7 +4710,7 @@
 </p:sld>
 </file>
 
-<file path=ppt/slides/slide11.xml><?xml version="1.0" encoding="utf-8"?>
+<file path=ppt/slides/slide12.xml><?xml version="1.0" encoding="utf-8"?>
 <p:sld xmlns:a="http://schemas.openxmlformats.org/drawingml/2006/main" xmlns:r="http://schemas.openxmlformats.org/officeDocument/2006/relationships" xmlns:p="http://schemas.openxmlformats.org/presentationml/2006/main">
   <p:cSld>
     <p:spTree>
@@ -4479,7 +4732,7 @@
           <p:cNvPr id="2" name="Title 1">
             <a:extLst>
               <a:ext uri="{FF2B5EF4-FFF2-40B4-BE49-F238E27FC236}">
-                <a16:creationId xmlns:a16="http://schemas.microsoft.com/office/drawing/2014/main" id="{A6F1AB56-3838-49CD-8884-823F7BFE9A5E}"/>
+                <a16:creationId xmlns:a16="http://schemas.microsoft.com/office/drawing/2014/main" xmlns="" id="{A6F1AB56-3838-49CD-8884-823F7BFE9A5E}"/>
               </a:ext>
             </a:extLst>
           </p:cNvPr>
@@ -4508,7 +4761,7 @@
           <p:cNvPr id="3" name="Content Placeholder 2">
             <a:extLst>
               <a:ext uri="{FF2B5EF4-FFF2-40B4-BE49-F238E27FC236}">
-                <a16:creationId xmlns:a16="http://schemas.microsoft.com/office/drawing/2014/main" id="{DD26B66D-DC32-4122-8D1D-9BB60F32FA1E}"/>
+                <a16:creationId xmlns:a16="http://schemas.microsoft.com/office/drawing/2014/main" xmlns="" id="{DD26B66D-DC32-4122-8D1D-9BB60F32FA1E}"/>
               </a:ext>
             </a:extLst>
           </p:cNvPr>
@@ -4522,7 +4775,7 @@
         <p:spPr/>
         <p:txBody>
           <a:bodyPr>
-            <a:normAutofit lnSpcReduction="10000"/>
+            <a:normAutofit/>
           </a:bodyPr>
           <a:lstStyle/>
           <a:p>
@@ -4566,23 +4819,6 @@
             </a:r>
             <a:r>
               <a:rPr lang="en-IN" dirty="0"/>
-              <a:t>Scalability – Make it generic to make this solution to be reusable for other </a:t>
-            </a:r>
-            <a:r>
-              <a:rPr lang="en-IN" dirty="0" smtClean="0"/>
-              <a:t>marketplaces</a:t>
-            </a:r>
-          </a:p>
-          <a:p>
-            <a:endParaRPr lang="en-IN" dirty="0"/>
-          </a:p>
-          <a:p>
-            <a:r>
-              <a:rPr lang="en-IN" dirty="0" smtClean="0"/>
-              <a:t>Improve </a:t>
-            </a:r>
-            <a:r>
-              <a:rPr lang="en-IN" dirty="0"/>
               <a:t>the User Interface</a:t>
             </a:r>
             <a:endParaRPr lang="x-none" dirty="0"/>
@@ -4594,7 +4830,7 @@
           <p:cNvPr id="4" name="Slide Number Placeholder 3">
             <a:extLst>
               <a:ext uri="{FF2B5EF4-FFF2-40B4-BE49-F238E27FC236}">
-                <a16:creationId xmlns:a16="http://schemas.microsoft.com/office/drawing/2014/main" id="{280C9F7E-A2BE-4BC0-A973-BCBA5123E1EB}"/>
+                <a16:creationId xmlns:a16="http://schemas.microsoft.com/office/drawing/2014/main" xmlns="" id="{280C9F7E-A2BE-4BC0-A973-BCBA5123E1EB}"/>
               </a:ext>
             </a:extLst>
           </p:cNvPr>
@@ -4613,7 +4849,7 @@
             <a:fld id="{1BEDFFD4-B6F5-47F1-AF42-063036A3A505}" type="slidenum">
               <a:rPr lang="x-none" smtClean="0"/>
               <a:pPr/>
-              <a:t>11</a:t>
+              <a:t>12</a:t>
             </a:fld>
             <a:endParaRPr lang="x-none"/>
           </a:p>
@@ -4638,7 +4874,7 @@
             <p:cNvPr id="7" name="Picture 6" descr="A picture containing object&#10;&#10;Description automatically generated">
               <a:extLst>
                 <a:ext uri="{FF2B5EF4-FFF2-40B4-BE49-F238E27FC236}">
-                  <a16:creationId xmlns:a16="http://schemas.microsoft.com/office/drawing/2014/main" id="{E4589177-0206-43CD-A920-C47FFB866F9A}"/>
+                  <a16:creationId xmlns:a16="http://schemas.microsoft.com/office/drawing/2014/main" xmlns="" id="{E4589177-0206-43CD-A920-C47FFB866F9A}"/>
                 </a:ext>
               </a:extLst>
             </p:cNvPr>
@@ -4651,7 +4887,7 @@
             <a:blip r:embed="rId2" cstate="print">
               <a:extLst>
                 <a:ext uri="{28A0092B-C50C-407E-A947-70E740481C1C}">
-                  <a14:useLocalDpi xmlns:a14="http://schemas.microsoft.com/office/drawing/2010/main" val="0"/>
+                  <a14:useLocalDpi xmlns:a14="http://schemas.microsoft.com/office/drawing/2010/main" xmlns="" val="0"/>
                 </a:ext>
               </a:extLst>
             </a:blip>
@@ -4750,7 +4986,7 @@
     </p:spTree>
     <p:extLst>
       <p:ext uri="{BB962C8B-B14F-4D97-AF65-F5344CB8AC3E}">
-        <p14:creationId xmlns:p14="http://schemas.microsoft.com/office/powerpoint/2010/main" val="2965628164"/>
+        <p14:creationId xmlns:p14="http://schemas.microsoft.com/office/powerpoint/2010/main" xmlns="" val="2965628164"/>
       </p:ext>
     </p:extLst>
   </p:cSld>
@@ -4789,7 +5025,7 @@
           <p:cNvPr id="2" name="Title 1">
             <a:extLst>
               <a:ext uri="{FF2B5EF4-FFF2-40B4-BE49-F238E27FC236}">
-                <a16:creationId xmlns:a16="http://schemas.microsoft.com/office/drawing/2014/main" id="{30D51EBC-2799-4C1C-A24F-7995EDD4675E}"/>
+                <a16:creationId xmlns:a16="http://schemas.microsoft.com/office/drawing/2014/main" xmlns="" id="{30D51EBC-2799-4C1C-A24F-7995EDD4675E}"/>
               </a:ext>
             </a:extLst>
           </p:cNvPr>
@@ -4818,7 +5054,7 @@
           <p:cNvPr id="3" name="Content Placeholder 2">
             <a:extLst>
               <a:ext uri="{FF2B5EF4-FFF2-40B4-BE49-F238E27FC236}">
-                <a16:creationId xmlns:a16="http://schemas.microsoft.com/office/drawing/2014/main" id="{7751106A-FFE4-4DC4-803A-89C56BEB1763}"/>
+                <a16:creationId xmlns:a16="http://schemas.microsoft.com/office/drawing/2014/main" xmlns="" id="{7751106A-FFE4-4DC4-803A-89C56BEB1763}"/>
               </a:ext>
             </a:extLst>
           </p:cNvPr>
@@ -5048,7 +5284,7 @@
           <p:cNvPr id="4" name="Slide Number Placeholder 3">
             <a:extLst>
               <a:ext uri="{FF2B5EF4-FFF2-40B4-BE49-F238E27FC236}">
-                <a16:creationId xmlns:a16="http://schemas.microsoft.com/office/drawing/2014/main" id="{517CD00A-D786-4F8B-8CB6-6246C268993A}"/>
+                <a16:creationId xmlns:a16="http://schemas.microsoft.com/office/drawing/2014/main" xmlns="" id="{517CD00A-D786-4F8B-8CB6-6246C268993A}"/>
               </a:ext>
             </a:extLst>
           </p:cNvPr>
@@ -5092,7 +5328,7 @@
             <p:cNvPr id="7" name="Picture 6" descr="A picture containing object&#10;&#10;Description automatically generated">
               <a:extLst>
                 <a:ext uri="{FF2B5EF4-FFF2-40B4-BE49-F238E27FC236}">
-                  <a16:creationId xmlns:a16="http://schemas.microsoft.com/office/drawing/2014/main" id="{E4589177-0206-43CD-A920-C47FFB866F9A}"/>
+                  <a16:creationId xmlns:a16="http://schemas.microsoft.com/office/drawing/2014/main" xmlns="" id="{E4589177-0206-43CD-A920-C47FFB866F9A}"/>
                 </a:ext>
               </a:extLst>
             </p:cNvPr>
@@ -5105,7 +5341,7 @@
             <a:blip r:embed="rId2" cstate="print">
               <a:extLst>
                 <a:ext uri="{28A0092B-C50C-407E-A947-70E740481C1C}">
-                  <a14:useLocalDpi xmlns:a14="http://schemas.microsoft.com/office/drawing/2010/main" val="0"/>
+                  <a14:useLocalDpi xmlns:a14="http://schemas.microsoft.com/office/drawing/2010/main" xmlns="" val="0"/>
                 </a:ext>
               </a:extLst>
             </a:blip>
@@ -5204,7 +5440,7 @@
     </p:spTree>
     <p:extLst>
       <p:ext uri="{BB962C8B-B14F-4D97-AF65-F5344CB8AC3E}">
-        <p14:creationId xmlns:p14="http://schemas.microsoft.com/office/powerpoint/2010/main" val="1476208215"/>
+        <p14:creationId xmlns:p14="http://schemas.microsoft.com/office/powerpoint/2010/main" xmlns="" val="1476208215"/>
       </p:ext>
     </p:extLst>
   </p:cSld>
@@ -5243,7 +5479,7 @@
           <p:cNvPr id="2" name="Title 1">
             <a:extLst>
               <a:ext uri="{FF2B5EF4-FFF2-40B4-BE49-F238E27FC236}">
-                <a16:creationId xmlns:a16="http://schemas.microsoft.com/office/drawing/2014/main" id="{D914CD34-AA6B-4345-B4CB-4E0197C1980B}"/>
+                <a16:creationId xmlns:a16="http://schemas.microsoft.com/office/drawing/2014/main" xmlns="" id="{D914CD34-AA6B-4345-B4CB-4E0197C1980B}"/>
               </a:ext>
             </a:extLst>
           </p:cNvPr>
@@ -5272,7 +5508,7 @@
           <p:cNvPr id="3" name="Content Placeholder 2">
             <a:extLst>
               <a:ext uri="{FF2B5EF4-FFF2-40B4-BE49-F238E27FC236}">
-                <a16:creationId xmlns:a16="http://schemas.microsoft.com/office/drawing/2014/main" id="{F5D4F868-2A8C-439A-848A-408C2E7A3842}"/>
+                <a16:creationId xmlns:a16="http://schemas.microsoft.com/office/drawing/2014/main" xmlns="" id="{F5D4F868-2A8C-439A-848A-408C2E7A3842}"/>
               </a:ext>
             </a:extLst>
           </p:cNvPr>
@@ -5342,7 +5578,7 @@
           <p:cNvPr id="4" name="Slide Number Placeholder 3">
             <a:extLst>
               <a:ext uri="{FF2B5EF4-FFF2-40B4-BE49-F238E27FC236}">
-                <a16:creationId xmlns:a16="http://schemas.microsoft.com/office/drawing/2014/main" id="{1E4D56F0-C698-4129-90D7-3C393655CF08}"/>
+                <a16:creationId xmlns:a16="http://schemas.microsoft.com/office/drawing/2014/main" xmlns="" id="{1E4D56F0-C698-4129-90D7-3C393655CF08}"/>
               </a:ext>
             </a:extLst>
           </p:cNvPr>
@@ -5386,7 +5622,7 @@
             <p:cNvPr id="7" name="Picture 6" descr="A picture containing object&#10;&#10;Description automatically generated">
               <a:extLst>
                 <a:ext uri="{FF2B5EF4-FFF2-40B4-BE49-F238E27FC236}">
-                  <a16:creationId xmlns:a16="http://schemas.microsoft.com/office/drawing/2014/main" id="{E4589177-0206-43CD-A920-C47FFB866F9A}"/>
+                  <a16:creationId xmlns:a16="http://schemas.microsoft.com/office/drawing/2014/main" xmlns="" id="{E4589177-0206-43CD-A920-C47FFB866F9A}"/>
                 </a:ext>
               </a:extLst>
             </p:cNvPr>
@@ -5399,7 +5635,7 @@
             <a:blip r:embed="rId2" cstate="print">
               <a:extLst>
                 <a:ext uri="{28A0092B-C50C-407E-A947-70E740481C1C}">
-                  <a14:useLocalDpi xmlns:a14="http://schemas.microsoft.com/office/drawing/2010/main" val="0"/>
+                  <a14:useLocalDpi xmlns:a14="http://schemas.microsoft.com/office/drawing/2010/main" xmlns="" val="0"/>
                 </a:ext>
               </a:extLst>
             </a:blip>
@@ -5498,7 +5734,7 @@
     </p:spTree>
     <p:extLst>
       <p:ext uri="{BB962C8B-B14F-4D97-AF65-F5344CB8AC3E}">
-        <p14:creationId xmlns:p14="http://schemas.microsoft.com/office/powerpoint/2010/main" val="2940745796"/>
+        <p14:creationId xmlns:p14="http://schemas.microsoft.com/office/powerpoint/2010/main" xmlns="" val="2940745796"/>
       </p:ext>
     </p:extLst>
   </p:cSld>
@@ -5537,7 +5773,7 @@
           <p:cNvPr id="2" name="Title 1">
             <a:extLst>
               <a:ext uri="{FF2B5EF4-FFF2-40B4-BE49-F238E27FC236}">
-                <a16:creationId xmlns:a16="http://schemas.microsoft.com/office/drawing/2014/main" id="{A5236F04-B3EF-4A32-829D-784D1539C9FE}"/>
+                <a16:creationId xmlns:a16="http://schemas.microsoft.com/office/drawing/2014/main" xmlns="" id="{A5236F04-B3EF-4A32-829D-784D1539C9FE}"/>
               </a:ext>
             </a:extLst>
           </p:cNvPr>
@@ -5566,7 +5802,7 @@
           <p:cNvPr id="3" name="Content Placeholder 2">
             <a:extLst>
               <a:ext uri="{FF2B5EF4-FFF2-40B4-BE49-F238E27FC236}">
-                <a16:creationId xmlns:a16="http://schemas.microsoft.com/office/drawing/2014/main" id="{C12DA82B-875F-43C1-A314-468D7B322B2E}"/>
+                <a16:creationId xmlns:a16="http://schemas.microsoft.com/office/drawing/2014/main" xmlns="" id="{C12DA82B-875F-43C1-A314-468D7B322B2E}"/>
               </a:ext>
             </a:extLst>
           </p:cNvPr>
@@ -5639,7 +5875,7 @@
           <p:cNvPr id="4" name="Slide Number Placeholder 3">
             <a:extLst>
               <a:ext uri="{FF2B5EF4-FFF2-40B4-BE49-F238E27FC236}">
-                <a16:creationId xmlns:a16="http://schemas.microsoft.com/office/drawing/2014/main" id="{ADB3CEA3-3918-4F21-8043-C7B0B13D89C6}"/>
+                <a16:creationId xmlns:a16="http://schemas.microsoft.com/office/drawing/2014/main" xmlns="" id="{ADB3CEA3-3918-4F21-8043-C7B0B13D89C6}"/>
               </a:ext>
             </a:extLst>
           </p:cNvPr>
@@ -5683,7 +5919,7 @@
             <p:cNvPr id="7" name="Picture 6" descr="A picture containing object&#10;&#10;Description automatically generated">
               <a:extLst>
                 <a:ext uri="{FF2B5EF4-FFF2-40B4-BE49-F238E27FC236}">
-                  <a16:creationId xmlns:a16="http://schemas.microsoft.com/office/drawing/2014/main" id="{E4589177-0206-43CD-A920-C47FFB866F9A}"/>
+                  <a16:creationId xmlns:a16="http://schemas.microsoft.com/office/drawing/2014/main" xmlns="" id="{E4589177-0206-43CD-A920-C47FFB866F9A}"/>
                 </a:ext>
               </a:extLst>
             </p:cNvPr>
@@ -5696,7 +5932,7 @@
             <a:blip r:embed="rId2" cstate="print">
               <a:extLst>
                 <a:ext uri="{28A0092B-C50C-407E-A947-70E740481C1C}">
-                  <a14:useLocalDpi xmlns:a14="http://schemas.microsoft.com/office/drawing/2010/main" val="0"/>
+                  <a14:useLocalDpi xmlns:a14="http://schemas.microsoft.com/office/drawing/2010/main" xmlns="" val="0"/>
                 </a:ext>
               </a:extLst>
             </a:blip>
@@ -5795,7 +6031,7 @@
     </p:spTree>
     <p:extLst>
       <p:ext uri="{BB962C8B-B14F-4D97-AF65-F5344CB8AC3E}">
-        <p14:creationId xmlns:p14="http://schemas.microsoft.com/office/powerpoint/2010/main" val="3485720571"/>
+        <p14:creationId xmlns:p14="http://schemas.microsoft.com/office/powerpoint/2010/main" xmlns="" val="3485720571"/>
       </p:ext>
     </p:extLst>
   </p:cSld>
@@ -5834,7 +6070,7 @@
           <p:cNvPr id="2" name="Title 1">
             <a:extLst>
               <a:ext uri="{FF2B5EF4-FFF2-40B4-BE49-F238E27FC236}">
-                <a16:creationId xmlns:a16="http://schemas.microsoft.com/office/drawing/2014/main" id="{A5236F04-B3EF-4A32-829D-784D1539C9FE}"/>
+                <a16:creationId xmlns:a16="http://schemas.microsoft.com/office/drawing/2014/main" xmlns="" id="{A5236F04-B3EF-4A32-829D-784D1539C9FE}"/>
               </a:ext>
             </a:extLst>
           </p:cNvPr>
@@ -5867,7 +6103,7 @@
           <p:cNvPr id="3" name="Content Placeholder 2">
             <a:extLst>
               <a:ext uri="{FF2B5EF4-FFF2-40B4-BE49-F238E27FC236}">
-                <a16:creationId xmlns:a16="http://schemas.microsoft.com/office/drawing/2014/main" id="{C12DA82B-875F-43C1-A314-468D7B322B2E}"/>
+                <a16:creationId xmlns:a16="http://schemas.microsoft.com/office/drawing/2014/main" xmlns="" id="{C12DA82B-875F-43C1-A314-468D7B322B2E}"/>
               </a:ext>
             </a:extLst>
           </p:cNvPr>
@@ -6027,7 +6263,7 @@
           <p:cNvPr id="4" name="Slide Number Placeholder 3">
             <a:extLst>
               <a:ext uri="{FF2B5EF4-FFF2-40B4-BE49-F238E27FC236}">
-                <a16:creationId xmlns:a16="http://schemas.microsoft.com/office/drawing/2014/main" id="{ADB3CEA3-3918-4F21-8043-C7B0B13D89C6}"/>
+                <a16:creationId xmlns:a16="http://schemas.microsoft.com/office/drawing/2014/main" xmlns="" id="{ADB3CEA3-3918-4F21-8043-C7B0B13D89C6}"/>
               </a:ext>
             </a:extLst>
           </p:cNvPr>
@@ -6071,7 +6307,7 @@
             <p:cNvPr id="7" name="Picture 6" descr="A picture containing object&#10;&#10;Description automatically generated">
               <a:extLst>
                 <a:ext uri="{FF2B5EF4-FFF2-40B4-BE49-F238E27FC236}">
-                  <a16:creationId xmlns:a16="http://schemas.microsoft.com/office/drawing/2014/main" id="{E4589177-0206-43CD-A920-C47FFB866F9A}"/>
+                  <a16:creationId xmlns:a16="http://schemas.microsoft.com/office/drawing/2014/main" xmlns="" id="{E4589177-0206-43CD-A920-C47FFB866F9A}"/>
                 </a:ext>
               </a:extLst>
             </p:cNvPr>
@@ -6084,7 +6320,7 @@
             <a:blip r:embed="rId2" cstate="print">
               <a:extLst>
                 <a:ext uri="{28A0092B-C50C-407E-A947-70E740481C1C}">
-                  <a14:useLocalDpi xmlns:a14="http://schemas.microsoft.com/office/drawing/2010/main" val="0"/>
+                  <a14:useLocalDpi xmlns:a14="http://schemas.microsoft.com/office/drawing/2010/main" xmlns="" val="0"/>
                 </a:ext>
               </a:extLst>
             </a:blip>
@@ -6183,7 +6419,7 @@
     </p:spTree>
     <p:extLst>
       <p:ext uri="{BB962C8B-B14F-4D97-AF65-F5344CB8AC3E}">
-        <p14:creationId xmlns:p14="http://schemas.microsoft.com/office/powerpoint/2010/main" val="3485720571"/>
+        <p14:creationId xmlns:p14="http://schemas.microsoft.com/office/powerpoint/2010/main" xmlns="" val="3485720571"/>
       </p:ext>
     </p:extLst>
   </p:cSld>
@@ -6222,7 +6458,7 @@
           <p:cNvPr id="2" name="Title 1">
             <a:extLst>
               <a:ext uri="{FF2B5EF4-FFF2-40B4-BE49-F238E27FC236}">
-                <a16:creationId xmlns:a16="http://schemas.microsoft.com/office/drawing/2014/main" id="{A5236F04-B3EF-4A32-829D-784D1539C9FE}"/>
+                <a16:creationId xmlns:a16="http://schemas.microsoft.com/office/drawing/2014/main" xmlns="" id="{A5236F04-B3EF-4A32-829D-784D1539C9FE}"/>
               </a:ext>
             </a:extLst>
           </p:cNvPr>
@@ -6251,7 +6487,7 @@
           <p:cNvPr id="3" name="Content Placeholder 2">
             <a:extLst>
               <a:ext uri="{FF2B5EF4-FFF2-40B4-BE49-F238E27FC236}">
-                <a16:creationId xmlns:a16="http://schemas.microsoft.com/office/drawing/2014/main" id="{C12DA82B-875F-43C1-A314-468D7B322B2E}"/>
+                <a16:creationId xmlns:a16="http://schemas.microsoft.com/office/drawing/2014/main" xmlns="" id="{C12DA82B-875F-43C1-A314-468D7B322B2E}"/>
               </a:ext>
             </a:extLst>
           </p:cNvPr>
@@ -6332,7 +6568,7 @@
           <p:cNvPr id="4" name="Slide Number Placeholder 3">
             <a:extLst>
               <a:ext uri="{FF2B5EF4-FFF2-40B4-BE49-F238E27FC236}">
-                <a16:creationId xmlns:a16="http://schemas.microsoft.com/office/drawing/2014/main" id="{ADB3CEA3-3918-4F21-8043-C7B0B13D89C6}"/>
+                <a16:creationId xmlns:a16="http://schemas.microsoft.com/office/drawing/2014/main" xmlns="" id="{ADB3CEA3-3918-4F21-8043-C7B0B13D89C6}"/>
               </a:ext>
             </a:extLst>
           </p:cNvPr>
@@ -6376,7 +6612,7 @@
             <p:cNvPr id="7" name="Picture 6" descr="A picture containing object&#10;&#10;Description automatically generated">
               <a:extLst>
                 <a:ext uri="{FF2B5EF4-FFF2-40B4-BE49-F238E27FC236}">
-                  <a16:creationId xmlns:a16="http://schemas.microsoft.com/office/drawing/2014/main" id="{E4589177-0206-43CD-A920-C47FFB866F9A}"/>
+                  <a16:creationId xmlns:a16="http://schemas.microsoft.com/office/drawing/2014/main" xmlns="" id="{E4589177-0206-43CD-A920-C47FFB866F9A}"/>
                 </a:ext>
               </a:extLst>
             </p:cNvPr>
@@ -6389,7 +6625,7 @@
             <a:blip r:embed="rId2" cstate="print">
               <a:extLst>
                 <a:ext uri="{28A0092B-C50C-407E-A947-70E740481C1C}">
-                  <a14:useLocalDpi xmlns:a14="http://schemas.microsoft.com/office/drawing/2010/main" val="0"/>
+                  <a14:useLocalDpi xmlns:a14="http://schemas.microsoft.com/office/drawing/2010/main" xmlns="" val="0"/>
                 </a:ext>
               </a:extLst>
             </a:blip>
@@ -6488,7 +6724,7 @@
     </p:spTree>
     <p:extLst>
       <p:ext uri="{BB962C8B-B14F-4D97-AF65-F5344CB8AC3E}">
-        <p14:creationId xmlns:p14="http://schemas.microsoft.com/office/powerpoint/2010/main" val="3485720571"/>
+        <p14:creationId xmlns:p14="http://schemas.microsoft.com/office/powerpoint/2010/main" xmlns="" val="3485720571"/>
       </p:ext>
     </p:extLst>
   </p:cSld>
@@ -6527,7 +6763,7 @@
           <p:cNvPr id="2" name="Title 1">
             <a:extLst>
               <a:ext uri="{FF2B5EF4-FFF2-40B4-BE49-F238E27FC236}">
-                <a16:creationId xmlns:a16="http://schemas.microsoft.com/office/drawing/2014/main" id="{B3E78310-F236-4657-9AA4-0596BCC909CD}"/>
+                <a16:creationId xmlns:a16="http://schemas.microsoft.com/office/drawing/2014/main" xmlns="" id="{B3E78310-F236-4657-9AA4-0596BCC909CD}"/>
               </a:ext>
             </a:extLst>
           </p:cNvPr>
@@ -6556,7 +6792,7 @@
           <p:cNvPr id="3" name="Content Placeholder 2">
             <a:extLst>
               <a:ext uri="{FF2B5EF4-FFF2-40B4-BE49-F238E27FC236}">
-                <a16:creationId xmlns:a16="http://schemas.microsoft.com/office/drawing/2014/main" id="{5BF884F5-5AD8-4A52-BC8D-5E653C44E65B}"/>
+                <a16:creationId xmlns:a16="http://schemas.microsoft.com/office/drawing/2014/main" xmlns="" id="{5BF884F5-5AD8-4A52-BC8D-5E653C44E65B}"/>
               </a:ext>
             </a:extLst>
           </p:cNvPr>
@@ -6628,7 +6864,7 @@
           <p:cNvPr id="4" name="Slide Number Placeholder 3">
             <a:extLst>
               <a:ext uri="{FF2B5EF4-FFF2-40B4-BE49-F238E27FC236}">
-                <a16:creationId xmlns:a16="http://schemas.microsoft.com/office/drawing/2014/main" id="{145FA464-2810-402A-A0D5-84C355C1D18A}"/>
+                <a16:creationId xmlns:a16="http://schemas.microsoft.com/office/drawing/2014/main" xmlns="" id="{145FA464-2810-402A-A0D5-84C355C1D18A}"/>
               </a:ext>
             </a:extLst>
           </p:cNvPr>
@@ -6672,7 +6908,7 @@
             <p:cNvPr id="7" name="Picture 6" descr="A picture containing object&#10;&#10;Description automatically generated">
               <a:extLst>
                 <a:ext uri="{FF2B5EF4-FFF2-40B4-BE49-F238E27FC236}">
-                  <a16:creationId xmlns:a16="http://schemas.microsoft.com/office/drawing/2014/main" id="{E4589177-0206-43CD-A920-C47FFB866F9A}"/>
+                  <a16:creationId xmlns:a16="http://schemas.microsoft.com/office/drawing/2014/main" xmlns="" id="{E4589177-0206-43CD-A920-C47FFB866F9A}"/>
                 </a:ext>
               </a:extLst>
             </p:cNvPr>
@@ -6685,7 +6921,7 @@
             <a:blip r:embed="rId3" cstate="print">
               <a:extLst>
                 <a:ext uri="{28A0092B-C50C-407E-A947-70E740481C1C}">
-                  <a14:useLocalDpi xmlns:a14="http://schemas.microsoft.com/office/drawing/2010/main" val="0"/>
+                  <a14:useLocalDpi xmlns:a14="http://schemas.microsoft.com/office/drawing/2010/main" xmlns="" val="0"/>
                 </a:ext>
               </a:extLst>
             </a:blip>
@@ -6784,7 +7020,7 @@
     </p:spTree>
     <p:extLst>
       <p:ext uri="{BB962C8B-B14F-4D97-AF65-F5344CB8AC3E}">
-        <p14:creationId xmlns:p14="http://schemas.microsoft.com/office/powerpoint/2010/main" val="1121421148"/>
+        <p14:creationId xmlns:p14="http://schemas.microsoft.com/office/powerpoint/2010/main" xmlns="" val="1121421148"/>
       </p:ext>
     </p:extLst>
   </p:cSld>
@@ -6823,7 +7059,7 @@
           <p:cNvPr id="2" name="Title 1">
             <a:extLst>
               <a:ext uri="{FF2B5EF4-FFF2-40B4-BE49-F238E27FC236}">
-                <a16:creationId xmlns:a16="http://schemas.microsoft.com/office/drawing/2014/main" id="{FE1401C1-B4D1-4DB1-8423-84A5863BEF30}"/>
+                <a16:creationId xmlns:a16="http://schemas.microsoft.com/office/drawing/2014/main" xmlns="" id="{FE1401C1-B4D1-4DB1-8423-84A5863BEF30}"/>
               </a:ext>
             </a:extLst>
           </p:cNvPr>
@@ -6852,7 +7088,7 @@
           <p:cNvPr id="3" name="Content Placeholder 2">
             <a:extLst>
               <a:ext uri="{FF2B5EF4-FFF2-40B4-BE49-F238E27FC236}">
-                <a16:creationId xmlns:a16="http://schemas.microsoft.com/office/drawing/2014/main" id="{F3BCB68E-A995-4B03-A068-DCE5C88FF8F5}"/>
+                <a16:creationId xmlns:a16="http://schemas.microsoft.com/office/drawing/2014/main" xmlns="" id="{F3BCB68E-A995-4B03-A068-DCE5C88FF8F5}"/>
               </a:ext>
             </a:extLst>
           </p:cNvPr>
@@ -7164,7 +7400,7 @@
           <p:cNvPr id="4" name="Slide Number Placeholder 3">
             <a:extLst>
               <a:ext uri="{FF2B5EF4-FFF2-40B4-BE49-F238E27FC236}">
-                <a16:creationId xmlns:a16="http://schemas.microsoft.com/office/drawing/2014/main" id="{3316F4E0-730A-4FEE-9017-EE74B1C06734}"/>
+                <a16:creationId xmlns:a16="http://schemas.microsoft.com/office/drawing/2014/main" xmlns="" id="{3316F4E0-730A-4FEE-9017-EE74B1C06734}"/>
               </a:ext>
             </a:extLst>
           </p:cNvPr>
@@ -7191,7 +7427,7 @@
       </p:sp>
       <p:grpSp>
         <p:nvGrpSpPr>
-          <p:cNvPr id="6" name="Group 5"/>
+          <p:cNvPr id="5" name="Group 5"/>
           <p:cNvGrpSpPr/>
           <p:nvPr/>
         </p:nvGrpSpPr>
@@ -7208,7 +7444,7 @@
             <p:cNvPr id="7" name="Picture 6" descr="A picture containing object&#10;&#10;Description automatically generated">
               <a:extLst>
                 <a:ext uri="{FF2B5EF4-FFF2-40B4-BE49-F238E27FC236}">
-                  <a16:creationId xmlns:a16="http://schemas.microsoft.com/office/drawing/2014/main" id="{E4589177-0206-43CD-A920-C47FFB866F9A}"/>
+                  <a16:creationId xmlns:a16="http://schemas.microsoft.com/office/drawing/2014/main" xmlns="" id="{E4589177-0206-43CD-A920-C47FFB866F9A}"/>
                 </a:ext>
               </a:extLst>
             </p:cNvPr>
@@ -7221,7 +7457,7 @@
             <a:blip r:embed="rId2" cstate="print">
               <a:extLst>
                 <a:ext uri="{28A0092B-C50C-407E-A947-70E740481C1C}">
-                  <a14:useLocalDpi xmlns:a14="http://schemas.microsoft.com/office/drawing/2010/main" val="0"/>
+                  <a14:useLocalDpi xmlns:a14="http://schemas.microsoft.com/office/drawing/2010/main" xmlns="" val="0"/>
                 </a:ext>
               </a:extLst>
             </a:blip>
@@ -7320,7 +7556,7 @@
     </p:spTree>
     <p:extLst>
       <p:ext uri="{BB962C8B-B14F-4D97-AF65-F5344CB8AC3E}">
-        <p14:creationId xmlns:p14="http://schemas.microsoft.com/office/powerpoint/2010/main" val="2710496697"/>
+        <p14:creationId xmlns:p14="http://schemas.microsoft.com/office/powerpoint/2010/main" xmlns="" val="2710496697"/>
       </p:ext>
     </p:extLst>
   </p:cSld>
@@ -7359,7 +7595,7 @@
           <p:cNvPr id="2" name="Title 1">
             <a:extLst>
               <a:ext uri="{FF2B5EF4-FFF2-40B4-BE49-F238E27FC236}">
-                <a16:creationId xmlns:a16="http://schemas.microsoft.com/office/drawing/2014/main" id="{BD13EB1C-7B6B-4D07-AF79-AF0F1FB29BDA}"/>
+                <a16:creationId xmlns:a16="http://schemas.microsoft.com/office/drawing/2014/main" xmlns="" id="{FE1401C1-B4D1-4DB1-8423-84A5863BEF30}"/>
               </a:ext>
             </a:extLst>
           </p:cNvPr>
@@ -7370,23 +7606,233 @@
             <p:ph type="title"/>
           </p:nvPr>
         </p:nvSpPr>
-        <p:spPr>
-          <a:xfrm>
-            <a:off x="838200" y="2511977"/>
-            <a:ext cx="10515600" cy="1325563"/>
-          </a:xfrm>
-        </p:spPr>
+        <p:spPr/>
+        <p:txBody>
+          <a:bodyPr/>
+          <a:lstStyle/>
+          <a:p>
+            <a:r>
+              <a:rPr lang="en-US" dirty="0" smtClean="0"/>
+              <a:t>Deliverables</a:t>
+            </a:r>
+            <a:endParaRPr lang="x-none" dirty="0"/>
+          </a:p>
+        </p:txBody>
+      </p:sp>
+      <p:sp>
+        <p:nvSpPr>
+          <p:cNvPr id="3" name="Content Placeholder 2">
+            <a:extLst>
+              <a:ext uri="{FF2B5EF4-FFF2-40B4-BE49-F238E27FC236}">
+                <a16:creationId xmlns:a16="http://schemas.microsoft.com/office/drawing/2014/main" xmlns="" id="{F3BCB68E-A995-4B03-A068-DCE5C88FF8F5}"/>
+              </a:ext>
+            </a:extLst>
+          </p:cNvPr>
+          <p:cNvSpPr>
+            <a:spLocks noGrp="1"/>
+          </p:cNvSpPr>
+          <p:nvPr>
+            <p:ph idx="1"/>
+          </p:nvPr>
+        </p:nvSpPr>
+        <p:spPr/>
         <p:txBody>
           <a:bodyPr>
             <a:normAutofit/>
           </a:bodyPr>
           <a:lstStyle/>
           <a:p>
-            <a:r>
-              <a:rPr lang="en-US" sz="6600" dirty="0"/>
-              <a:t>Thank you</a:t>
-            </a:r>
-            <a:endParaRPr lang="x-none" sz="6600" dirty="0"/>
+            <a:pPr lvl="0">
+              <a:lnSpc>
+                <a:spcPct val="107000"/>
+              </a:lnSpc>
+              <a:spcBef>
+                <a:spcPts val="0"/>
+              </a:spcBef>
+              <a:buFont typeface="Symbol" panose="05050102010706020507" pitchFamily="18" charset="2"/>
+              <a:buChar char=""/>
+            </a:pPr>
+            <a:r>
+              <a:rPr lang="en-US" dirty="0" smtClean="0">
+                <a:latin typeface="Calibri" panose="020F0502020204030204" pitchFamily="34" charset="0"/>
+                <a:ea typeface="Calibri" panose="020F0502020204030204" pitchFamily="34" charset="0"/>
+                <a:cs typeface="Times New Roman" panose="02020603050405020304" pitchFamily="18" charset="0"/>
+              </a:rPr>
+              <a:t>UI (User Interface)</a:t>
+            </a:r>
+          </a:p>
+          <a:p>
+            <a:pPr lvl="0">
+              <a:lnSpc>
+                <a:spcPct val="107000"/>
+              </a:lnSpc>
+              <a:spcBef>
+                <a:spcPts val="0"/>
+              </a:spcBef>
+              <a:buFont typeface="Symbol" panose="05050102010706020507" pitchFamily="18" charset="2"/>
+              <a:buChar char=""/>
+            </a:pPr>
+            <a:endParaRPr lang="en-US" dirty="0" smtClean="0">
+              <a:latin typeface="Calibri" panose="020F0502020204030204" pitchFamily="34" charset="0"/>
+              <a:ea typeface="Calibri" panose="020F0502020204030204" pitchFamily="34" charset="0"/>
+              <a:cs typeface="Times New Roman" panose="02020603050405020304" pitchFamily="18" charset="0"/>
+            </a:endParaRPr>
+          </a:p>
+          <a:p>
+            <a:pPr lvl="0">
+              <a:lnSpc>
+                <a:spcPct val="107000"/>
+              </a:lnSpc>
+              <a:spcBef>
+                <a:spcPts val="0"/>
+              </a:spcBef>
+              <a:buFont typeface="Symbol" panose="05050102010706020507" pitchFamily="18" charset="2"/>
+              <a:buChar char=""/>
+            </a:pPr>
+            <a:r>
+              <a:rPr lang="en-US" dirty="0" err="1" smtClean="0">
+                <a:latin typeface="Calibri" panose="020F0502020204030204" pitchFamily="34" charset="0"/>
+                <a:ea typeface="Calibri" panose="020F0502020204030204" pitchFamily="34" charset="0"/>
+                <a:cs typeface="Times New Roman" panose="02020603050405020304" pitchFamily="18" charset="0"/>
+              </a:rPr>
+              <a:t>DApp</a:t>
+            </a:r>
+            <a:r>
+              <a:rPr lang="en-US" dirty="0" smtClean="0">
+                <a:latin typeface="Calibri" panose="020F0502020204030204" pitchFamily="34" charset="0"/>
+                <a:ea typeface="Calibri" panose="020F0502020204030204" pitchFamily="34" charset="0"/>
+                <a:cs typeface="Times New Roman" panose="02020603050405020304" pitchFamily="18" charset="0"/>
+              </a:rPr>
+              <a:t> </a:t>
+            </a:r>
+            <a:r>
+              <a:rPr lang="en-US" dirty="0" smtClean="0">
+                <a:latin typeface="Calibri" panose="020F0502020204030204" pitchFamily="34" charset="0"/>
+                <a:ea typeface="Calibri" panose="020F0502020204030204" pitchFamily="34" charset="0"/>
+                <a:cs typeface="Times New Roman" panose="02020603050405020304" pitchFamily="18" charset="0"/>
+              </a:rPr>
+              <a:t>(Middleware to connect to Blockchain</a:t>
+            </a:r>
+            <a:r>
+              <a:rPr lang="en-US" dirty="0" smtClean="0">
+                <a:latin typeface="Calibri" panose="020F0502020204030204" pitchFamily="34" charset="0"/>
+                <a:ea typeface="Calibri" panose="020F0502020204030204" pitchFamily="34" charset="0"/>
+                <a:cs typeface="Times New Roman" panose="02020603050405020304" pitchFamily="18" charset="0"/>
+              </a:rPr>
+              <a:t>)</a:t>
+            </a:r>
+          </a:p>
+          <a:p>
+            <a:pPr lvl="0">
+              <a:lnSpc>
+                <a:spcPct val="107000"/>
+              </a:lnSpc>
+              <a:spcBef>
+                <a:spcPts val="0"/>
+              </a:spcBef>
+              <a:buFont typeface="Symbol" panose="05050102010706020507" pitchFamily="18" charset="2"/>
+              <a:buChar char=""/>
+            </a:pPr>
+            <a:endParaRPr lang="en-US" dirty="0" smtClean="0">
+              <a:latin typeface="Calibri" panose="020F0502020204030204" pitchFamily="34" charset="0"/>
+              <a:ea typeface="Calibri" panose="020F0502020204030204" pitchFamily="34" charset="0"/>
+              <a:cs typeface="Times New Roman" panose="02020603050405020304" pitchFamily="18" charset="0"/>
+            </a:endParaRPr>
+          </a:p>
+          <a:p>
+            <a:pPr lvl="0">
+              <a:lnSpc>
+                <a:spcPct val="107000"/>
+              </a:lnSpc>
+              <a:spcBef>
+                <a:spcPts val="0"/>
+              </a:spcBef>
+              <a:buFont typeface="Symbol" panose="05050102010706020507" pitchFamily="18" charset="2"/>
+              <a:buChar char=""/>
+            </a:pPr>
+            <a:r>
+              <a:rPr lang="en-US" dirty="0" smtClean="0">
+                <a:latin typeface="Calibri" panose="020F0502020204030204" pitchFamily="34" charset="0"/>
+                <a:ea typeface="Calibri" panose="020F0502020204030204" pitchFamily="34" charset="0"/>
+                <a:cs typeface="Times New Roman" panose="02020603050405020304" pitchFamily="18" charset="0"/>
+              </a:rPr>
+              <a:t>Smart </a:t>
+            </a:r>
+            <a:r>
+              <a:rPr lang="en-US" dirty="0" smtClean="0">
+                <a:latin typeface="Calibri" panose="020F0502020204030204" pitchFamily="34" charset="0"/>
+                <a:ea typeface="Calibri" panose="020F0502020204030204" pitchFamily="34" charset="0"/>
+                <a:cs typeface="Times New Roman" panose="02020603050405020304" pitchFamily="18" charset="0"/>
+              </a:rPr>
+              <a:t>Contract</a:t>
+            </a:r>
+          </a:p>
+          <a:p>
+            <a:pPr lvl="0">
+              <a:lnSpc>
+                <a:spcPct val="107000"/>
+              </a:lnSpc>
+              <a:spcBef>
+                <a:spcPts val="0"/>
+              </a:spcBef>
+              <a:buFont typeface="Symbol" panose="05050102010706020507" pitchFamily="18" charset="2"/>
+              <a:buChar char=""/>
+            </a:pPr>
+            <a:endParaRPr lang="en-US" dirty="0" smtClean="0">
+              <a:latin typeface="Calibri" panose="020F0502020204030204" pitchFamily="34" charset="0"/>
+              <a:ea typeface="Calibri" panose="020F0502020204030204" pitchFamily="34" charset="0"/>
+              <a:cs typeface="Times New Roman" panose="02020603050405020304" pitchFamily="18" charset="0"/>
+            </a:endParaRPr>
+          </a:p>
+          <a:p>
+            <a:pPr lvl="0">
+              <a:lnSpc>
+                <a:spcPct val="107000"/>
+              </a:lnSpc>
+              <a:spcBef>
+                <a:spcPts val="0"/>
+              </a:spcBef>
+              <a:buFont typeface="Symbol" panose="05050102010706020507" pitchFamily="18" charset="2"/>
+              <a:buChar char=""/>
+            </a:pPr>
+            <a:r>
+              <a:rPr lang="en-US" dirty="0" smtClean="0">
+                <a:latin typeface="Calibri" panose="020F0502020204030204" pitchFamily="34" charset="0"/>
+                <a:ea typeface="Calibri" panose="020F0502020204030204" pitchFamily="34" charset="0"/>
+                <a:cs typeface="Times New Roman" panose="02020603050405020304" pitchFamily="18" charset="0"/>
+              </a:rPr>
+              <a:t>The Ethereum based Blockchain </a:t>
+            </a:r>
+            <a:r>
+              <a:rPr lang="en-US" dirty="0" smtClean="0">
+                <a:latin typeface="Calibri" panose="020F0502020204030204" pitchFamily="34" charset="0"/>
+                <a:ea typeface="Calibri" panose="020F0502020204030204" pitchFamily="34" charset="0"/>
+                <a:cs typeface="Times New Roman" panose="02020603050405020304" pitchFamily="18" charset="0"/>
+              </a:rPr>
+              <a:t>Network</a:t>
+            </a:r>
+            <a:endParaRPr lang="en-US" dirty="0" smtClean="0">
+              <a:latin typeface="Calibri" panose="020F0502020204030204" pitchFamily="34" charset="0"/>
+              <a:ea typeface="Calibri" panose="020F0502020204030204" pitchFamily="34" charset="0"/>
+              <a:cs typeface="Times New Roman" panose="02020603050405020304" pitchFamily="18" charset="0"/>
+            </a:endParaRPr>
+          </a:p>
+          <a:p>
+            <a:pPr lvl="0">
+              <a:lnSpc>
+                <a:spcPct val="107000"/>
+              </a:lnSpc>
+              <a:spcBef>
+                <a:spcPts val="0"/>
+              </a:spcBef>
+              <a:buFont typeface="Symbol" panose="05050102010706020507" pitchFamily="18" charset="2"/>
+              <a:buChar char=""/>
+            </a:pPr>
+            <a:endParaRPr lang="en-US" dirty="0">
+              <a:latin typeface="Calibri" panose="020F0502020204030204" pitchFamily="34" charset="0"/>
+              <a:ea typeface="Calibri" panose="020F0502020204030204" pitchFamily="34" charset="0"/>
+              <a:cs typeface="Times New Roman" panose="02020603050405020304" pitchFamily="18" charset="0"/>
+            </a:endParaRPr>
           </a:p>
         </p:txBody>
       </p:sp>
@@ -7395,7 +7841,7 @@
           <p:cNvPr id="4" name="Slide Number Placeholder 3">
             <a:extLst>
               <a:ext uri="{FF2B5EF4-FFF2-40B4-BE49-F238E27FC236}">
-                <a16:creationId xmlns:a16="http://schemas.microsoft.com/office/drawing/2014/main" id="{ED112E45-08B5-4810-AA0F-3DDD82E887C1}"/>
+                <a16:creationId xmlns:a16="http://schemas.microsoft.com/office/drawing/2014/main" xmlns="" id="{3316F4E0-730A-4FEE-9017-EE74B1C06734}"/>
               </a:ext>
             </a:extLst>
           </p:cNvPr>
@@ -7422,7 +7868,7 @@
       </p:sp>
       <p:grpSp>
         <p:nvGrpSpPr>
-          <p:cNvPr id="5" name="Group 4"/>
+          <p:cNvPr id="6" name="Group 5"/>
           <p:cNvGrpSpPr/>
           <p:nvPr/>
         </p:nvGrpSpPr>
@@ -7436,10 +7882,10 @@
         </p:grpSpPr>
         <p:pic>
           <p:nvPicPr>
-            <p:cNvPr id="6" name="Picture 5" descr="A picture containing object&#10;&#10;Description automatically generated">
+            <p:cNvPr id="7" name="Picture 6" descr="A picture containing object&#10;&#10;Description automatically generated">
               <a:extLst>
                 <a:ext uri="{FF2B5EF4-FFF2-40B4-BE49-F238E27FC236}">
-                  <a16:creationId xmlns:a16="http://schemas.microsoft.com/office/drawing/2014/main" id="{E4589177-0206-43CD-A920-C47FFB866F9A}"/>
+                  <a16:creationId xmlns:a16="http://schemas.microsoft.com/office/drawing/2014/main" xmlns="" id="{E4589177-0206-43CD-A920-C47FFB866F9A}"/>
                 </a:ext>
               </a:extLst>
             </p:cNvPr>
@@ -7452,7 +7898,7 @@
             <a:blip r:embed="rId2" cstate="print">
               <a:extLst>
                 <a:ext uri="{28A0092B-C50C-407E-A947-70E740481C1C}">
-                  <a14:useLocalDpi xmlns:a14="http://schemas.microsoft.com/office/drawing/2010/main" val="0"/>
+                  <a14:useLocalDpi xmlns:a14="http://schemas.microsoft.com/office/drawing/2010/main" xmlns="" val="0"/>
                 </a:ext>
               </a:extLst>
             </a:blip>
@@ -7473,7 +7919,7 @@
         </p:pic>
         <p:sp>
           <p:nvSpPr>
-            <p:cNvPr id="7" name="Rectangle 6"/>
+            <p:cNvPr id="8" name="Rectangle 7"/>
             <p:cNvSpPr/>
             <p:nvPr/>
           </p:nvSpPr>
@@ -7551,7 +7997,7 @@
     </p:spTree>
     <p:extLst>
       <p:ext uri="{BB962C8B-B14F-4D97-AF65-F5344CB8AC3E}">
-        <p14:creationId xmlns:p14="http://schemas.microsoft.com/office/powerpoint/2010/main" val="2756391746"/>
+        <p14:creationId xmlns:p14="http://schemas.microsoft.com/office/powerpoint/2010/main" xmlns="" val="2710496697"/>
       </p:ext>
     </p:extLst>
   </p:cSld>
@@ -7857,7 +8303,7 @@
   <a:extraClrSchemeLst/>
   <a:extLst>
     <a:ext uri="{05A4C25C-085E-4340-85A3-A5531E510DB2}">
-      <thm15:themeFamily xmlns:thm15="http://schemas.microsoft.com/office/thememl/2012/main" name="Office Theme" id="{62F939B6-93AF-4DB8-9C6B-D6C7DFDC589F}" vid="{4A3C46E8-61CC-4603-A589-7422A47A8E4A}"/>
+      <thm15:themeFamily xmlns:thm15="http://schemas.microsoft.com/office/thememl/2012/main" xmlns="" name="Office Theme" id="{62F939B6-93AF-4DB8-9C6B-D6C7DFDC589F}" vid="{4A3C46E8-61CC-4603-A589-7422A47A8E4A}"/>
     </a:ext>
   </a:extLst>
 </a:theme>
@@ -8152,7 +8598,7 @@
   <a:extraClrSchemeLst/>
   <a:extLst>
     <a:ext uri="{05A4C25C-085E-4340-85A3-A5531E510DB2}">
-      <thm15:themeFamily xmlns:thm15="http://schemas.microsoft.com/office/thememl/2012/main" name="Office Theme" id="{62F939B6-93AF-4DB8-9C6B-D6C7DFDC589F}" vid="{4A3C46E8-61CC-4603-A589-7422A47A8E4A}"/>
+      <thm15:themeFamily xmlns:thm15="http://schemas.microsoft.com/office/thememl/2012/main" xmlns="" name="Office Theme" id="{62F939B6-93AF-4DB8-9C6B-D6C7DFDC589F}" vid="{4A3C46E8-61CC-4603-A589-7422A47A8E4A}"/>
     </a:ext>
   </a:extLst>
 </a:theme>
@@ -8447,7 +8893,7 @@
   <a:extraClrSchemeLst/>
   <a:extLst>
     <a:ext uri="{05A4C25C-085E-4340-85A3-A5531E510DB2}">
-      <thm15:themeFamily xmlns:thm15="http://schemas.microsoft.com/office/thememl/2012/main" name="Office Theme" id="{62F939B6-93AF-4DB8-9C6B-D6C7DFDC589F}" vid="{4A3C46E8-61CC-4603-A589-7422A47A8E4A}"/>
+      <thm15:themeFamily xmlns:thm15="http://schemas.microsoft.com/office/thememl/2012/main" xmlns="" name="Office Theme" id="{62F939B6-93AF-4DB8-9C6B-D6C7DFDC589F}" vid="{4A3C46E8-61CC-4603-A589-7422A47A8E4A}"/>
     </a:ext>
   </a:extLst>
 </a:theme>

</xml_diff>

<commit_message>
New version - added more reference links
</commit_message>
<xml_diff>
--- a/The Cattle MarketPlace Solution.pptx
+++ b/The Cattle MarketPlace Solution.pptx
@@ -835,7 +835,7 @@
             <a:fld id="{543B8876-8781-4047-8CE5-1D813D7FC77F}" type="datetime8">
               <a:rPr lang="x-none" smtClean="0"/>
               <a:pPr/>
-              <a:t>01-08-2019 10:06</a:t>
+              <a:t>01-08-2019 10:21</a:t>
             </a:fld>
             <a:endParaRPr lang="x-none"/>
           </a:p>
@@ -1037,7 +1037,7 @@
             <a:fld id="{5DF7619D-40A3-4EBA-BFBE-A7151DBA219C}" type="datetime8">
               <a:rPr lang="x-none" smtClean="0"/>
               <a:pPr/>
-              <a:t>01-08-2019 10:06</a:t>
+              <a:t>01-08-2019 10:21</a:t>
             </a:fld>
             <a:endParaRPr lang="x-none"/>
           </a:p>
@@ -1249,7 +1249,7 @@
             <a:fld id="{FA7BC6A9-4CF0-4EC3-A54E-BA7D4E39DD56}" type="datetime8">
               <a:rPr lang="x-none" smtClean="0"/>
               <a:pPr/>
-              <a:t>01-08-2019 10:06</a:t>
+              <a:t>01-08-2019 10:21</a:t>
             </a:fld>
             <a:endParaRPr lang="x-none"/>
           </a:p>
@@ -1451,7 +1451,7 @@
             <a:fld id="{B5160B0B-0905-4F80-9B79-6ED48855F355}" type="datetime8">
               <a:rPr lang="x-none" smtClean="0"/>
               <a:pPr/>
-              <a:t>01-08-2019 10:06</a:t>
+              <a:t>01-08-2019 10:21</a:t>
             </a:fld>
             <a:endParaRPr lang="x-none"/>
           </a:p>
@@ -1729,7 +1729,7 @@
             <a:fld id="{F77771E0-D1A0-495A-A685-4E4503F9074D}" type="datetime8">
               <a:rPr lang="x-none" smtClean="0"/>
               <a:pPr/>
-              <a:t>01-08-2019 10:06</a:t>
+              <a:t>01-08-2019 10:21</a:t>
             </a:fld>
             <a:endParaRPr lang="x-none"/>
           </a:p>
@@ -1999,7 +1999,7 @@
             <a:fld id="{C98FE287-2B1B-4053-9336-FD8ADED2A25E}" type="datetime8">
               <a:rPr lang="x-none" smtClean="0"/>
               <a:pPr/>
-              <a:t>01-08-2019 10:06</a:t>
+              <a:t>01-08-2019 10:21</a:t>
             </a:fld>
             <a:endParaRPr lang="x-none"/>
           </a:p>
@@ -2416,7 +2416,7 @@
             <a:fld id="{FAFEC031-5F87-4A57-81D2-081FD130CAF5}" type="datetime8">
               <a:rPr lang="x-none" smtClean="0"/>
               <a:pPr/>
-              <a:t>01-08-2019 10:06</a:t>
+              <a:t>01-08-2019 10:21</a:t>
             </a:fld>
             <a:endParaRPr lang="x-none"/>
           </a:p>
@@ -2560,7 +2560,7 @@
             <a:fld id="{6E507422-109C-4C1C-B1EB-63AEC703E02F}" type="datetime8">
               <a:rPr lang="x-none" smtClean="0"/>
               <a:pPr/>
-              <a:t>01-08-2019 10:06</a:t>
+              <a:t>01-08-2019 10:21</a:t>
             </a:fld>
             <a:endParaRPr lang="x-none"/>
           </a:p>
@@ -2675,7 +2675,7 @@
             <a:fld id="{AD6B5F6E-A40D-44F4-A146-BD04EAF16D32}" type="datetime8">
               <a:rPr lang="x-none" smtClean="0"/>
               <a:pPr/>
-              <a:t>01-08-2019 10:06</a:t>
+              <a:t>01-08-2019 10:21</a:t>
             </a:fld>
             <a:endParaRPr lang="x-none"/>
           </a:p>
@@ -2990,7 +2990,7 @@
             <a:fld id="{589E83A2-32B4-44C6-94CC-A08A017D02CF}" type="datetime8">
               <a:rPr lang="x-none" smtClean="0"/>
               <a:pPr/>
-              <a:t>01-08-2019 10:06</a:t>
+              <a:t>01-08-2019 10:21</a:t>
             </a:fld>
             <a:endParaRPr lang="x-none"/>
           </a:p>
@@ -3281,7 +3281,7 @@
             <a:fld id="{D9028CC8-D893-4944-A0C0-4475208982C3}" type="datetime8">
               <a:rPr lang="x-none" smtClean="0"/>
               <a:pPr/>
-              <a:t>01-08-2019 10:06</a:t>
+              <a:t>01-08-2019 10:21</a:t>
             </a:fld>
             <a:endParaRPr lang="x-none"/>
           </a:p>
@@ -3526,7 +3526,7 @@
             <a:fld id="{F828E01B-D182-46E2-8D8F-B81C922CC6F0}" type="datetime8">
               <a:rPr lang="x-none" smtClean="0"/>
               <a:pPr/>
-              <a:t>01-08-2019 10:06</a:t>
+              <a:t>01-08-2019 10:21</a:t>
             </a:fld>
             <a:endParaRPr lang="x-none"/>
           </a:p>
@@ -5684,13 +5684,55 @@
               <a:rPr lang="en-IN" dirty="0" smtClean="0">
                 <a:hlinkClick r:id="rId2"/>
               </a:rPr>
-              <a:t>The </a:t>
+              <a:t>Video - The </a:t>
             </a:r>
             <a:r>
               <a:rPr lang="en-IN" dirty="0">
                 <a:hlinkClick r:id="rId2"/>
               </a:rPr>
-              <a:t>Cattle Marketplace Solution</a:t>
+              <a:t>Cattle Marketplace </a:t>
+            </a:r>
+            <a:r>
+              <a:rPr lang="en-IN" dirty="0" smtClean="0">
+                <a:hlinkClick r:id="rId2"/>
+              </a:rPr>
+              <a:t>Solution</a:t>
+            </a:r>
+            <a:endParaRPr lang="en-IN" dirty="0" smtClean="0"/>
+          </a:p>
+          <a:p>
+            <a:pPr marL="0" indent="0" algn="ctr">
+              <a:buNone/>
+            </a:pPr>
+            <a:r>
+              <a:rPr lang="en-US" dirty="0" smtClean="0">
+                <a:hlinkClick r:id="rId3"/>
+              </a:rPr>
+              <a:t>GitHub - </a:t>
+            </a:r>
+            <a:r>
+              <a:rPr lang="en-IN" dirty="0">
+                <a:hlinkClick r:id="rId3"/>
+              </a:rPr>
+              <a:t>The Cattle Marketplace Solution</a:t>
+            </a:r>
+            <a:r>
+              <a:rPr lang="en-US" dirty="0" smtClean="0">
+                <a:hlinkClick r:id="rId3"/>
+              </a:rPr>
+              <a:t> </a:t>
+            </a:r>
+            <a:endParaRPr lang="en-US" dirty="0" smtClean="0"/>
+          </a:p>
+          <a:p>
+            <a:pPr marL="0" indent="0" algn="ctr">
+              <a:buNone/>
+            </a:pPr>
+            <a:r>
+              <a:rPr lang="en-US" dirty="0" smtClean="0">
+                <a:hlinkClick r:id="rId4"/>
+              </a:rPr>
+              <a:t>The Application Workflow</a:t>
             </a:r>
             <a:endParaRPr lang="en-IN" dirty="0"/>
           </a:p>

</xml_diff>

<commit_message>
Updated Thank You Slide
</commit_message>
<xml_diff>
--- a/The Cattle MarketPlace Solution.pptx
+++ b/The Cattle MarketPlace Solution.pptx
@@ -835,7 +835,7 @@
             <a:fld id="{543B8876-8781-4047-8CE5-1D813D7FC77F}" type="datetime8">
               <a:rPr lang="x-none" smtClean="0"/>
               <a:pPr/>
-              <a:t>01-08-2019 10:21</a:t>
+              <a:t>01-08-2019 10:29</a:t>
             </a:fld>
             <a:endParaRPr lang="x-none"/>
           </a:p>
@@ -1037,7 +1037,7 @@
             <a:fld id="{5DF7619D-40A3-4EBA-BFBE-A7151DBA219C}" type="datetime8">
               <a:rPr lang="x-none" smtClean="0"/>
               <a:pPr/>
-              <a:t>01-08-2019 10:21</a:t>
+              <a:t>01-08-2019 10:29</a:t>
             </a:fld>
             <a:endParaRPr lang="x-none"/>
           </a:p>
@@ -1249,7 +1249,7 @@
             <a:fld id="{FA7BC6A9-4CF0-4EC3-A54E-BA7D4E39DD56}" type="datetime8">
               <a:rPr lang="x-none" smtClean="0"/>
               <a:pPr/>
-              <a:t>01-08-2019 10:21</a:t>
+              <a:t>01-08-2019 10:29</a:t>
             </a:fld>
             <a:endParaRPr lang="x-none"/>
           </a:p>
@@ -1451,7 +1451,7 @@
             <a:fld id="{B5160B0B-0905-4F80-9B79-6ED48855F355}" type="datetime8">
               <a:rPr lang="x-none" smtClean="0"/>
               <a:pPr/>
-              <a:t>01-08-2019 10:21</a:t>
+              <a:t>01-08-2019 10:29</a:t>
             </a:fld>
             <a:endParaRPr lang="x-none"/>
           </a:p>
@@ -1729,7 +1729,7 @@
             <a:fld id="{F77771E0-D1A0-495A-A685-4E4503F9074D}" type="datetime8">
               <a:rPr lang="x-none" smtClean="0"/>
               <a:pPr/>
-              <a:t>01-08-2019 10:21</a:t>
+              <a:t>01-08-2019 10:29</a:t>
             </a:fld>
             <a:endParaRPr lang="x-none"/>
           </a:p>
@@ -1999,7 +1999,7 @@
             <a:fld id="{C98FE287-2B1B-4053-9336-FD8ADED2A25E}" type="datetime8">
               <a:rPr lang="x-none" smtClean="0"/>
               <a:pPr/>
-              <a:t>01-08-2019 10:21</a:t>
+              <a:t>01-08-2019 10:29</a:t>
             </a:fld>
             <a:endParaRPr lang="x-none"/>
           </a:p>
@@ -2416,7 +2416,7 @@
             <a:fld id="{FAFEC031-5F87-4A57-81D2-081FD130CAF5}" type="datetime8">
               <a:rPr lang="x-none" smtClean="0"/>
               <a:pPr/>
-              <a:t>01-08-2019 10:21</a:t>
+              <a:t>01-08-2019 10:29</a:t>
             </a:fld>
             <a:endParaRPr lang="x-none"/>
           </a:p>
@@ -2560,7 +2560,7 @@
             <a:fld id="{6E507422-109C-4C1C-B1EB-63AEC703E02F}" type="datetime8">
               <a:rPr lang="x-none" smtClean="0"/>
               <a:pPr/>
-              <a:t>01-08-2019 10:21</a:t>
+              <a:t>01-08-2019 10:29</a:t>
             </a:fld>
             <a:endParaRPr lang="x-none"/>
           </a:p>
@@ -2675,7 +2675,7 @@
             <a:fld id="{AD6B5F6E-A40D-44F4-A146-BD04EAF16D32}" type="datetime8">
               <a:rPr lang="x-none" smtClean="0"/>
               <a:pPr/>
-              <a:t>01-08-2019 10:21</a:t>
+              <a:t>01-08-2019 10:29</a:t>
             </a:fld>
             <a:endParaRPr lang="x-none"/>
           </a:p>
@@ -2990,7 +2990,7 @@
             <a:fld id="{589E83A2-32B4-44C6-94CC-A08A017D02CF}" type="datetime8">
               <a:rPr lang="x-none" smtClean="0"/>
               <a:pPr/>
-              <a:t>01-08-2019 10:21</a:t>
+              <a:t>01-08-2019 10:29</a:t>
             </a:fld>
             <a:endParaRPr lang="x-none"/>
           </a:p>
@@ -3281,7 +3281,7 @@
             <a:fld id="{D9028CC8-D893-4944-A0C0-4475208982C3}" type="datetime8">
               <a:rPr lang="x-none" smtClean="0"/>
               <a:pPr/>
-              <a:t>01-08-2019 10:21</a:t>
+              <a:t>01-08-2019 10:29</a:t>
             </a:fld>
             <a:endParaRPr lang="x-none"/>
           </a:p>
@@ -3526,7 +3526,7 @@
             <a:fld id="{F828E01B-D182-46E2-8D8F-B81C922CC6F0}" type="datetime8">
               <a:rPr lang="x-none" smtClean="0"/>
               <a:pPr/>
-              <a:t>01-08-2019 10:21</a:t>
+              <a:t>01-08-2019 10:29</a:t>
             </a:fld>
             <a:endParaRPr lang="x-none"/>
           </a:p>
@@ -4035,13 +4035,10 @@
           </a:p>
           <a:p>
             <a:r>
-              <a:rPr lang="en-US" dirty="0"/>
-              <a:t>Code Gladiators </a:t>
-            </a:r>
-            <a:r>
               <a:rPr lang="en-US" dirty="0" smtClean="0"/>
-              <a:t>2019</a:t>
-            </a:r>
+              <a:t>Code Gladiators 2019</a:t>
+            </a:r>
+            <a:endParaRPr lang="en-US" dirty="0" smtClean="0"/>
           </a:p>
           <a:p>
             <a:endParaRPr lang="en-US" dirty="0" smtClean="0"/>
@@ -4122,6 +4119,7 @@
           </a:bodyPr>
           <a:lstStyle/>
           <a:p>
+            <a:pPr algn="ctr"/>
             <a:r>
               <a:rPr lang="en-US" sz="6600" dirty="0"/>
               <a:t>Thank you</a:t>
@@ -4157,6 +4155,87 @@
               <a:t>10</a:t>
             </a:fld>
             <a:endParaRPr lang="x-none"/>
+          </a:p>
+        </p:txBody>
+      </p:sp>
+      <p:sp>
+        <p:nvSpPr>
+          <p:cNvPr id="5" name="Title 1">
+            <a:extLst>
+              <a:ext uri="{FF2B5EF4-FFF2-40B4-BE49-F238E27FC236}">
+                <a16:creationId xmlns:a16="http://schemas.microsoft.com/office/drawing/2014/main" id="{BD13EB1C-7B6B-4D07-AF79-AF0F1FB29BDA}"/>
+              </a:ext>
+            </a:extLst>
+          </p:cNvPr>
+          <p:cNvSpPr txBox="1">
+            <a:spLocks/>
+          </p:cNvSpPr>
+          <p:nvPr/>
+        </p:nvSpPr>
+        <p:spPr>
+          <a:xfrm>
+            <a:off x="838200" y="3665863"/>
+            <a:ext cx="10515600" cy="2201537"/>
+          </a:xfrm>
+          <a:prstGeom prst="rect">
+            <a:avLst/>
+          </a:prstGeom>
+        </p:spPr>
+        <p:txBody>
+          <a:bodyPr vert="horz" lIns="91440" tIns="45720" rIns="91440" bIns="45720" rtlCol="0" anchor="ctr">
+            <a:normAutofit/>
+          </a:bodyPr>
+          <a:lstStyle>
+            <a:lvl1pPr algn="l" defTabSz="914400" rtl="0" eaLnBrk="1" latinLnBrk="0" hangingPunct="1">
+              <a:lnSpc>
+                <a:spcPct val="90000"/>
+              </a:lnSpc>
+              <a:spcBef>
+                <a:spcPct val="0"/>
+              </a:spcBef>
+              <a:buNone/>
+              <a:defRPr sz="4400" kern="1200">
+                <a:solidFill>
+                  <a:schemeClr val="tx1"/>
+                </a:solidFill>
+                <a:latin typeface="+mj-lt"/>
+                <a:ea typeface="+mj-ea"/>
+                <a:cs typeface="+mj-cs"/>
+              </a:defRPr>
+            </a:lvl1pPr>
+          </a:lstStyle>
+          <a:p>
+            <a:pPr algn="ctr"/>
+            <a:r>
+              <a:rPr lang="en-US" sz="1800" dirty="0" smtClean="0"/>
+              <a:t>Team Super Programmers</a:t>
+            </a:r>
+          </a:p>
+          <a:p>
+            <a:pPr algn="ctr"/>
+            <a:endParaRPr lang="en-US" sz="1800" dirty="0"/>
+          </a:p>
+          <a:p>
+            <a:pPr algn="ctr"/>
+            <a:r>
+              <a:rPr lang="en-US" sz="1800" b="1" dirty="0" smtClean="0"/>
+              <a:t>Parvez Mulla</a:t>
+            </a:r>
+          </a:p>
+          <a:p>
+            <a:pPr algn="ctr"/>
+            <a:r>
+              <a:rPr lang="en-US" sz="1800" dirty="0" smtClean="0"/>
+              <a:t>and</a:t>
+            </a:r>
+          </a:p>
+          <a:p>
+            <a:pPr algn="ctr"/>
+            <a:r>
+              <a:rPr lang="en-US" sz="1800" b="1" dirty="0" smtClean="0"/>
+              <a:t>Sachin Jegaonkar</a:t>
+            </a:r>
+            <a:endParaRPr lang="x-none" sz="1800" b="1" dirty="0"/>
           </a:p>
         </p:txBody>
       </p:sp>
@@ -4261,8 +4340,8 @@
               <a:t>Application is Mobile </a:t>
             </a:r>
             <a:r>
-              <a:rPr lang="en-US" dirty="0" err="1" smtClean="0"/>
-              <a:t>Compatibe</a:t>
+              <a:rPr lang="en-US" dirty="0" smtClean="0"/>
+              <a:t>Compatible</a:t>
             </a:r>
             <a:endParaRPr lang="x-none" dirty="0"/>
           </a:p>

</xml_diff>